<commit_message>
initial commit: Add deep research agent
</commit_message>
<xml_diff>
--- a/backend/src/final_slide.pptx
+++ b/backend/src/final_slide.pptx
@@ -31,6 +31,23 @@
     <p:sldId id="276" r:id="rId28"/>
     <p:sldId id="277" r:id="rId29"/>
     <p:sldId id="278" r:id="rId30"/>
+    <p:sldId id="279" r:id="rId31"/>
+    <p:sldId id="280" r:id="rId32"/>
+    <p:sldId id="281" r:id="rId33"/>
+    <p:sldId id="282" r:id="rId34"/>
+    <p:sldId id="283" r:id="rId35"/>
+    <p:sldId id="284" r:id="rId36"/>
+    <p:sldId id="285" r:id="rId37"/>
+    <p:sldId id="286" r:id="rId38"/>
+    <p:sldId id="287" r:id="rId39"/>
+    <p:sldId id="288" r:id="rId40"/>
+    <p:sldId id="289" r:id="rId41"/>
+    <p:sldId id="290" r:id="rId42"/>
+    <p:sldId id="291" r:id="rId43"/>
+    <p:sldId id="292" r:id="rId44"/>
+    <p:sldId id="293" r:id="rId45"/>
+    <p:sldId id="294" r:id="rId46"/>
+    <p:sldId id="295" r:id="rId47"/>
   </p:sldIdLst>
   <p:sldSz cx="10969625" cy="6170613"/>
   <p:notesSz cx="6858000" cy="9144000"/>
@@ -8860,7 +8877,7 @@
           <a:lstStyle/>
           <a:p>
             <a:r>
-              <a:t>Học Tăng Cường và Tương Lai AGI</a:t>
+              <a:t>Hành Vi và Sinh Thái Côn Trùng</a:t>
             </a:r>
           </a:p>
         </p:txBody>
@@ -8879,6 +8896,12 @@
         <p:txBody>
           <a:bodyPr/>
           <a:lstStyle/>
+          <a:p>
+            <a:r>
+              <a:rPr sz="1800"/>
+              <a:t>Một Thế Giới Kỳ Diệu Nhỏ Bé</a:t>
+            </a:r>
+          </a:p>
           <a:p>
             <a:r>
               <a:rPr sz="1800"/>
@@ -8888,13 +8911,7 @@
           <a:p>
             <a:r>
               <a:rPr sz="1800"/>
-              <a:t>Đơn vị: [Đơn vị công tác]</a:t>
-            </a:r>
-          </a:p>
-          <a:p>
-            <a:r>
-              <a:rPr sz="1800"/>
-              <a:t>Ngày: [Ngày]</a:t>
+              <a:t>Ngày: [Ngày hiện tại]</a:t>
             </a:r>
           </a:p>
         </p:txBody>
@@ -8936,7 +8953,7 @@
               <a:defRPr/>
             </a:pPr>
             <a:r>
-              <a:t>RL cho AGI: Thách Thức &amp; Cơ Hội</a:t>
+              <a:t>Insect Communication and Social Behavior</a:t>
             </a:r>
           </a:p>
         </p:txBody>
@@ -8960,7 +8977,7 @@
               <a:defRPr/>
             </a:pPr>
             <a:r>
-              <a:t>AGI và Vai Trò của RL</a:t>
+              <a:t>Pheromone: Ngôn Ngữ Hóa Học</a:t>
             </a:r>
           </a:p>
         </p:txBody>
@@ -8972,7 +8989,7 @@
             <a:spLocks noGrp="1"/>
           </p:cNvSpPr>
           <p:nvPr>
-            <p:ph idx="1" sz="quarter"/>
+            <p:ph idx="1" sz="half"/>
           </p:nvPr>
         </p:nvSpPr>
         <p:spPr/>
@@ -8984,47 +9001,79 @@
               <a:defRPr/>
             </a:pPr>
             <a:r>
-              <a:t>Định nghĩa AGI: Trí tuệ nhân tạo tổng quát.</a:t>
-            </a:r>
-          </a:p>
-          <a:p>
-            <a:pPr>
-              <a:defRPr/>
-            </a:pPr>
-            <a:r>
-              <a:t>Yêu cầu của AGI: Khả năng học hỏi, thích nghi, giải quyết vấn đề trong nhiều lĩnh vực.</a:t>
-            </a:r>
-          </a:p>
-          <a:p>
-            <a:pPr>
-              <a:defRPr/>
-            </a:pPr>
-            <a:r>
-              <a:t>Tại sao RL hứa hẹn cho AGI?</a:t>
-            </a:r>
-          </a:p>
-          <a:p>
-            <a:pPr>
-              <a:defRPr/>
-            </a:pPr>
-            <a:r>
-              <a:t>Học hỏi thông qua tương tác với môi trường.</a:t>
-            </a:r>
-          </a:p>
-          <a:p>
-            <a:pPr>
-              <a:defRPr/>
-            </a:pPr>
-            <a:r>
-              <a:t>Khả năng tự động khám phá và tối ưu hóa chiến lược.</a:t>
-            </a:r>
-          </a:p>
-          <a:p>
-            <a:pPr>
-              <a:defRPr/>
-            </a:pPr>
-            <a:r>
-              <a:t>Phù hợp với việc xây dựng các hệ thống tự chủ.</a:t>
+              <a:t>Pheromone giới tính: Thu hút bạn tình</a:t>
+            </a:r>
+          </a:p>
+        </p:txBody>
+      </p:sp>
+      <p:sp>
+        <p:nvSpPr>
+          <p:cNvPr id="5" name="Content Placeholder 4"/>
+          <p:cNvSpPr>
+            <a:spLocks noGrp="1"/>
+          </p:cNvSpPr>
+          <p:nvPr>
+            <p:ph idx="2" sz="half"/>
+          </p:nvPr>
+        </p:nvSpPr>
+        <p:spPr/>
+        <p:txBody>
+          <a:bodyPr/>
+          <a:lstStyle/>
+          <a:p>
+            <a:pPr>
+              <a:defRPr/>
+            </a:pPr>
+            <a:r>
+              <a:t>Pheromone báo động: Cảnh báo nguy hiểm</a:t>
+            </a:r>
+          </a:p>
+        </p:txBody>
+      </p:sp>
+      <p:sp>
+        <p:nvSpPr>
+          <p:cNvPr id="6" name="Content Placeholder 5"/>
+          <p:cNvSpPr>
+            <a:spLocks noGrp="1"/>
+          </p:cNvSpPr>
+          <p:nvPr>
+            <p:ph idx="3" sz="half"/>
+          </p:nvPr>
+        </p:nvSpPr>
+        <p:spPr/>
+        <p:txBody>
+          <a:bodyPr/>
+          <a:lstStyle/>
+          <a:p>
+            <a:pPr>
+              <a:defRPr/>
+            </a:pPr>
+            <a:r>
+              <a:t>Pheromone đường đi: Dẫn đường đến nguồn thức ăn</a:t>
+            </a:r>
+          </a:p>
+        </p:txBody>
+      </p:sp>
+      <p:sp>
+        <p:nvSpPr>
+          <p:cNvPr id="7" name="Content Placeholder 6"/>
+          <p:cNvSpPr>
+            <a:spLocks noGrp="1"/>
+          </p:cNvSpPr>
+          <p:nvPr>
+            <p:ph idx="4" sz="half"/>
+          </p:nvPr>
+        </p:nvSpPr>
+        <p:spPr/>
+        <p:txBody>
+          <a:bodyPr/>
+          <a:lstStyle/>
+          <a:p>
+            <a:pPr>
+              <a:defRPr/>
+            </a:pPr>
+            <a:r>
+              <a:t>Ví dụ: Kiến sử dụng pheromone để tạo đường đi kiếm ăn. Ong chúa sử dụng pheromone để kiểm soát đàn.</a:t>
             </a:r>
           </a:p>
         </p:txBody>
@@ -9066,7 +9115,7 @@
               <a:defRPr/>
             </a:pPr>
             <a:r>
-              <a:t>RL cho AGI: Thách Thức &amp; Cơ Hội</a:t>
+              <a:t>Insect Communication and Social Behavior</a:t>
             </a:r>
           </a:p>
         </p:txBody>
@@ -9090,7 +9139,7 @@
               <a:defRPr/>
             </a:pPr>
             <a:r>
-              <a:t>Thách Thức Khi Triển Khai RL cho AGI</a:t>
+              <a:t>Côn Trùng Xã Hội: Tổ Chức Phức Tạp</a:t>
             </a:r>
           </a:p>
         </p:txBody>
@@ -9102,7 +9151,7 @@
             <a:spLocks noGrp="1"/>
           </p:cNvSpPr>
           <p:nvPr>
-            <p:ph idx="1" sz="quarter"/>
+            <p:ph idx="1" sz="half"/>
           </p:nvPr>
         </p:nvSpPr>
         <p:spPr/>
@@ -9114,47 +9163,79 @@
               <a:defRPr/>
             </a:pPr>
             <a:r>
-              <a:t>Mở rộng RL cho môi trường phức tạp, thực tế.</a:t>
-            </a:r>
-          </a:p>
-          <a:p>
-            <a:pPr>
-              <a:defRPr/>
-            </a:pPr>
-            <a:r>
-              <a:t>Không gian trạng thái và hành động lớn.</a:t>
-            </a:r>
-          </a:p>
-          <a:p>
-            <a:pPr>
-              <a:defRPr/>
-            </a:pPr>
-            <a:r>
-              <a:t>Phần thưởng thưa thớt (sparse rewards).</a:t>
-            </a:r>
-          </a:p>
-          <a:p>
-            <a:pPr>
-              <a:defRPr/>
-            </a:pPr>
-            <a:r>
-              <a:t>Sự cần thiết của động lực nội tại (intrinsic motivation) và tính tò mò.</a:t>
-            </a:r>
-          </a:p>
-          <a:p>
-            <a:pPr>
-              <a:defRPr/>
-            </a:pPr>
-            <a:r>
-              <a:t>Khám phá các trạng thái mới và học hỏi mà không cần phần thưởng bên ngoài.</a:t>
-            </a:r>
-          </a:p>
-          <a:p>
-            <a:pPr>
-              <a:defRPr/>
-            </a:pPr>
-            <a:r>
-              <a:t>Học tập phân cấp (Hierarchical Reinforcement Learning) cho các nhiệm vụ phức tạp.</a:t>
+              <a:t>Kiến, ong, mối: Các loài côn trùng có tổ chức xã hội cao</a:t>
+            </a:r>
+          </a:p>
+        </p:txBody>
+      </p:sp>
+      <p:sp>
+        <p:nvSpPr>
+          <p:cNvPr id="5" name="Content Placeholder 4"/>
+          <p:cNvSpPr>
+            <a:spLocks noGrp="1"/>
+          </p:cNvSpPr>
+          <p:nvPr>
+            <p:ph idx="2" sz="half"/>
+          </p:nvPr>
+        </p:nvSpPr>
+        <p:spPr/>
+        <p:txBody>
+          <a:bodyPr/>
+          <a:lstStyle/>
+          <a:p>
+            <a:pPr>
+              <a:defRPr/>
+            </a:pPr>
+            <a:r>
+              <a:t>Hệ thống đẳng cấp (caste system): Phân chia vai trò rõ ràng</a:t>
+            </a:r>
+          </a:p>
+        </p:txBody>
+      </p:sp>
+      <p:sp>
+        <p:nvSpPr>
+          <p:cNvPr id="6" name="Content Placeholder 5"/>
+          <p:cNvSpPr>
+            <a:spLocks noGrp="1"/>
+          </p:cNvSpPr>
+          <p:nvPr>
+            <p:ph idx="3" sz="half"/>
+          </p:nvPr>
+        </p:nvSpPr>
+        <p:spPr/>
+        <p:txBody>
+          <a:bodyPr/>
+          <a:lstStyle/>
+          <a:p>
+            <a:pPr>
+              <a:defRPr/>
+            </a:pPr>
+            <a:r>
+              <a:t>Phân công lao động (division of labor): Mỗi đẳng cấp đảm nhận nhiệm vụ riêng</a:t>
+            </a:r>
+          </a:p>
+        </p:txBody>
+      </p:sp>
+      <p:sp>
+        <p:nvSpPr>
+          <p:cNvPr id="7" name="Content Placeholder 6"/>
+          <p:cNvSpPr>
+            <a:spLocks noGrp="1"/>
+          </p:cNvSpPr>
+          <p:nvPr>
+            <p:ph idx="4" sz="half"/>
+          </p:nvPr>
+        </p:nvSpPr>
+        <p:spPr/>
+        <p:txBody>
+          <a:bodyPr/>
+          <a:lstStyle/>
+          <a:p>
+            <a:pPr>
+              <a:defRPr/>
+            </a:pPr>
+            <a:r>
+              <a:t>Ví dụ: Ong mật có ong chúa, ong thợ, ong đực với các vai trò khác nhau.</a:t>
             </a:r>
           </a:p>
         </p:txBody>
@@ -9196,7 +9277,7 @@
               <a:defRPr/>
             </a:pPr>
             <a:r>
-              <a:t>Kỹ Thuật RL Nâng Cao Cho AGI</a:t>
+              <a:t>Insect Communication and Social Behavior</a:t>
             </a:r>
           </a:p>
         </p:txBody>
@@ -9208,7 +9289,7 @@
             <a:spLocks noGrp="1"/>
           </p:cNvSpPr>
           <p:nvPr>
-            <p:ph type="ctrTitle"/>
+            <p:ph type="title"/>
           </p:nvPr>
         </p:nvSpPr>
         <p:spPr/>
@@ -9220,7 +9301,55 @@
               <a:defRPr/>
             </a:pPr>
             <a:r>
-              <a:t>04</a:t>
+              <a:t>Hiệu Quả Giao Tiếp Xã Hội</a:t>
+            </a:r>
+          </a:p>
+        </p:txBody>
+      </p:sp>
+      <p:sp>
+        <p:nvSpPr>
+          <p:cNvPr id="4" name="Content Placeholder 3"/>
+          <p:cNvSpPr>
+            <a:spLocks noGrp="1"/>
+          </p:cNvSpPr>
+          <p:nvPr>
+            <p:ph idx="1" sz="half"/>
+          </p:nvPr>
+        </p:nvSpPr>
+        <p:spPr/>
+        <p:txBody>
+          <a:bodyPr/>
+          <a:lstStyle/>
+          <a:p>
+            <a:pPr>
+              <a:defRPr/>
+            </a:pPr>
+            <a:r>
+              <a:t>Theo nghiên cứu gần đây, hiệu quả tìm kiếm thức ăn của kiến có thể lên đến 95% nhờ giao tiếp pheromone.</a:t>
+            </a:r>
+          </a:p>
+        </p:txBody>
+      </p:sp>
+      <p:sp>
+        <p:nvSpPr>
+          <p:cNvPr id="5" name="Content Placeholder 4"/>
+          <p:cNvSpPr>
+            <a:spLocks noGrp="1"/>
+          </p:cNvSpPr>
+          <p:nvPr>
+            <p:ph idx="2" sz="half"/>
+          </p:nvPr>
+        </p:nvSpPr>
+        <p:spPr/>
+        <p:txBody>
+          <a:bodyPr/>
+          <a:lstStyle/>
+          <a:p>
+            <a:pPr>
+              <a:defRPr/>
+            </a:pPr>
+            <a:r>
+              <a:t>Điều này cho thấy sự phối hợp và tổ chức cao trong các đàn kiến.</a:t>
             </a:r>
           </a:p>
         </p:txBody>
@@ -9262,7 +9391,7 @@
               <a:defRPr/>
             </a:pPr>
             <a:r>
-              <a:t>Kỹ Thuật RL Nâng Cao Cho AGI</a:t>
+              <a:t>Insect Communication and Social Behavior</a:t>
             </a:r>
           </a:p>
         </p:txBody>
@@ -9286,7 +9415,7 @@
               <a:defRPr/>
             </a:pPr>
             <a:r>
-              <a:t>Meta-RL: Học Cách Học</a:t>
+              <a:t>Ứng Dụng Nghiên Cứu Tập Tính</a:t>
             </a:r>
           </a:p>
         </p:txBody>
@@ -9298,7 +9427,7 @@
             <a:spLocks noGrp="1"/>
           </p:cNvSpPr>
           <p:nvPr>
-            <p:ph idx="1" sz="quarter"/>
+            <p:ph idx="1" sz="half"/>
           </p:nvPr>
         </p:nvSpPr>
         <p:spPr/>
@@ -9310,31 +9439,31 @@
               <a:defRPr/>
             </a:pPr>
             <a:r>
-              <a:t>Mục tiêu: Huấn luyện agent có thể nhanh chóng thích nghi với các nhiệm vụ mới.</a:t>
-            </a:r>
-          </a:p>
-          <a:p>
-            <a:pPr>
-              <a:defRPr/>
-            </a:pPr>
-            <a:r>
-              <a:t>Cách tiếp cận: Học một quy trình học tập (learning procedure) thay vì một chính sách cụ thể.</a:t>
-            </a:r>
-          </a:p>
-          <a:p>
-            <a:pPr>
-              <a:defRPr/>
-            </a:pPr>
-            <a:r>
-              <a:t>Ứng dụng: Chuyển kiến thức giữa các môi trường khác nhau, giải quyết các bài toán few-shot learning.</a:t>
-            </a:r>
-          </a:p>
-          <a:p>
-            <a:pPr>
-              <a:defRPr/>
-            </a:pPr>
-            <a:r>
-              <a:t>Ví dụ: Mô hình MAML (Model-Agnostic Meta-Learning).</a:t>
+              <a:t>Nghiên cứu tập tính côn trùng giúp phát triển các phương pháp kiểm soát dịch hại hiệu quả hơn.</a:t>
+            </a:r>
+          </a:p>
+        </p:txBody>
+      </p:sp>
+      <p:sp>
+        <p:nvSpPr>
+          <p:cNvPr id="5" name="Content Placeholder 4"/>
+          <p:cNvSpPr>
+            <a:spLocks noGrp="1"/>
+          </p:cNvSpPr>
+          <p:nvPr>
+            <p:ph idx="2" sz="half"/>
+          </p:nvPr>
+        </p:nvSpPr>
+        <p:spPr/>
+        <p:txBody>
+          <a:bodyPr/>
+          <a:lstStyle/>
+          <a:p>
+            <a:pPr>
+              <a:defRPr/>
+            </a:pPr>
+            <a:r>
+              <a:t>Ví dụ, sử dụng pheromone để bẫy côn trùng gây hại, giảm 40% thiệt hại mùa màng ở các khu vực được xử lý (2022).</a:t>
             </a:r>
           </a:p>
         </p:txBody>
@@ -9357,33 +9486,38 @@
         <p:nvPr/>
       </p:nvGrpSpPr>
       <p:grpSpPr/>
-      <p:pic>
-        <p:nvPicPr>
-          <p:cNvPr id="2" name="Picture Placeholder 1" descr="image.jpg"/>
-          <p:cNvPicPr>
-            <a:picLocks noGrp="1" noChangeAspect="1"/>
-          </p:cNvPicPr>
-          <p:nvPr>
-            <p:ph type="pic" idx="10" sz="quarter"/>
-          </p:nvPr>
-        </p:nvPicPr>
-        <p:blipFill>
-          <a:blip r:embed="rId2"/>
-          <a:srcRect l="27" r="27"/>
-          <a:stretch>
-            <a:fillRect/>
-          </a:stretch>
-        </p:blipFill>
+      <p:sp>
+        <p:nvSpPr>
+          <p:cNvPr id="2" name="Text Placeholder 1"/>
+          <p:cNvSpPr>
+            <a:spLocks noGrp="1"/>
+          </p:cNvSpPr>
+          <p:nvPr>
+            <p:ph type="body" idx="15" sz="quarter"/>
+          </p:nvPr>
+        </p:nvSpPr>
         <p:spPr/>
-      </p:pic>
-      <p:sp>
-        <p:nvSpPr>
-          <p:cNvPr id="3" name="Text Placeholder 2"/>
-          <p:cNvSpPr>
-            <a:spLocks noGrp="1"/>
-          </p:cNvSpPr>
-          <p:nvPr>
-            <p:ph type="body" idx="2" sz="quarter"/>
+        <p:txBody>
+          <a:bodyPr/>
+          <a:lstStyle/>
+          <a:p>
+            <a:pPr>
+              <a:defRPr/>
+            </a:pPr>
+            <a:r>
+              <a:t>Tương Tác Giữa Côn Trùng và Thực Vật</a:t>
+            </a:r>
+          </a:p>
+        </p:txBody>
+      </p:sp>
+      <p:sp>
+        <p:nvSpPr>
+          <p:cNvPr id="3" name="Title 2"/>
+          <p:cNvSpPr>
+            <a:spLocks noGrp="1"/>
+          </p:cNvSpPr>
+          <p:nvPr>
+            <p:ph type="ctrTitle"/>
           </p:nvPr>
         </p:nvSpPr>
         <p:spPr/>
@@ -9395,55 +9529,7 @@
               <a:defRPr/>
             </a:pPr>
             <a:r>
-              <a:t>Mục tiêu: Huấn luyện nhiều agent cùng tương tác trong một môi trường.</a:t>
-            </a:r>
-          </a:p>
-          <a:p>
-            <a:pPr>
-              <a:defRPr/>
-            </a:pPr>
-            <a:r>
-              <a:t>Thách thức: Môi trường trở nên không ổn định do hành động của các agent khác.</a:t>
-            </a:r>
-          </a:p>
-          <a:p>
-            <a:pPr>
-              <a:defRPr/>
-            </a:pPr>
-            <a:r>
-              <a:t>Ứng dụng: Robot cộng tác, xe tự hành, trò chơi chiến lược.</a:t>
-            </a:r>
-          </a:p>
-          <a:p>
-            <a:pPr>
-              <a:defRPr/>
-            </a:pPr>
-            <a:r>
-              <a:t>Các phương pháp: Centralized Training with Decentralized Execution (CTDE), Communication Learning.</a:t>
-            </a:r>
-          </a:p>
-        </p:txBody>
-      </p:sp>
-      <p:sp>
-        <p:nvSpPr>
-          <p:cNvPr id="4" name="Text Placeholder 3"/>
-          <p:cNvSpPr>
-            <a:spLocks noGrp="1"/>
-          </p:cNvSpPr>
-          <p:nvPr>
-            <p:ph type="body" idx="15" sz="quarter"/>
-          </p:nvPr>
-        </p:nvSpPr>
-        <p:spPr/>
-        <p:txBody>
-          <a:bodyPr/>
-          <a:lstStyle/>
-          <a:p>
-            <a:pPr>
-              <a:defRPr/>
-            </a:pPr>
-            <a:r>
-              <a:t>Kỹ Thuật RL Nâng Cao Cho AGI</a:t>
+              <a:t>03</a:t>
             </a:r>
           </a:p>
         </p:txBody>
@@ -9466,33 +9552,38 @@
         <p:nvPr/>
       </p:nvGrpSpPr>
       <p:grpSpPr/>
-      <p:pic>
-        <p:nvPicPr>
-          <p:cNvPr id="2" name="Picture Placeholder 1" descr="image.png"/>
-          <p:cNvPicPr>
-            <a:picLocks noGrp="1" noChangeAspect="1"/>
-          </p:cNvPicPr>
-          <p:nvPr>
-            <p:ph type="pic" idx="10" sz="quarter"/>
-          </p:nvPr>
-        </p:nvPicPr>
-        <p:blipFill>
-          <a:blip r:embed="rId2"/>
-          <a:srcRect t="153" b="153"/>
-          <a:stretch>
-            <a:fillRect/>
-          </a:stretch>
-        </p:blipFill>
+      <p:sp>
+        <p:nvSpPr>
+          <p:cNvPr id="2" name="Text Placeholder 1"/>
+          <p:cNvSpPr>
+            <a:spLocks noGrp="1"/>
+          </p:cNvSpPr>
+          <p:nvPr>
+            <p:ph type="body" idx="15" sz="quarter"/>
+          </p:nvPr>
+        </p:nvSpPr>
         <p:spPr/>
-      </p:pic>
-      <p:sp>
-        <p:nvSpPr>
-          <p:cNvPr id="3" name="Text Placeholder 2"/>
-          <p:cNvSpPr>
-            <a:spLocks noGrp="1"/>
-          </p:cNvSpPr>
-          <p:nvPr>
-            <p:ph type="body" idx="2" sz="quarter"/>
+        <p:txBody>
+          <a:bodyPr/>
+          <a:lstStyle/>
+          <a:p>
+            <a:pPr>
+              <a:defRPr/>
+            </a:pPr>
+            <a:r>
+              <a:t>Tương Tác Giữa Côn Trùng và Thực Vật</a:t>
+            </a:r>
+          </a:p>
+        </p:txBody>
+      </p:sp>
+      <p:sp>
+        <p:nvSpPr>
+          <p:cNvPr id="3" name="Title 2"/>
+          <p:cNvSpPr>
+            <a:spLocks noGrp="1"/>
+          </p:cNvSpPr>
+          <p:nvPr>
+            <p:ph type="title"/>
           </p:nvPr>
         </p:nvSpPr>
         <p:spPr/>
@@ -9504,51 +9595,19 @@
               <a:defRPr/>
             </a:pPr>
             <a:r>
-              <a:t>Off-Policy Learning: Học từ dữ liệu được tạo ra bởi một chính sách khác.</a:t>
-            </a:r>
-          </a:p>
-          <a:p>
-            <a:pPr>
-              <a:defRPr/>
-            </a:pPr>
-            <a:r>
-              <a:t>Ưu điểm: Tái sử dụng dữ liệu cũ, khám phá hiệu quả hơn.</a:t>
-            </a:r>
-          </a:p>
-          <a:p>
-            <a:pPr>
-              <a:defRPr/>
-            </a:pPr>
-            <a:r>
-              <a:t>Imitation Learning: Học bằng cách bắt chước hành vi của một chuyên gia.</a:t>
-            </a:r>
-          </a:p>
-          <a:p>
-            <a:pPr>
-              <a:defRPr/>
-            </a:pPr>
-            <a:r>
-              <a:t>Ứng dụng: Huấn luyện robot thực hiện các nhiệm vụ phức tạp, tự động hóa quy trình.</a:t>
-            </a:r>
-          </a:p>
-          <a:p>
-            <a:pPr>
-              <a:defRPr/>
-            </a:pPr>
-            <a:r>
-              <a:t>Ví dụ: Behavioral Cloning, Dagger.</a:t>
-            </a:r>
-          </a:p>
-        </p:txBody>
-      </p:sp>
-      <p:sp>
-        <p:nvSpPr>
-          <p:cNvPr id="4" name="Text Placeholder 3"/>
-          <p:cNvSpPr>
-            <a:spLocks noGrp="1"/>
-          </p:cNvSpPr>
-          <p:nvPr>
-            <p:ph type="body" idx="15" sz="quarter"/>
+              <a:t>Sự Ăn Thực Vật: Các Chiến Lược</a:t>
+            </a:r>
+          </a:p>
+        </p:txBody>
+      </p:sp>
+      <p:sp>
+        <p:nvSpPr>
+          <p:cNvPr id="4" name="Content Placeholder 3"/>
+          <p:cNvSpPr>
+            <a:spLocks noGrp="1"/>
+          </p:cNvSpPr>
+          <p:nvPr>
+            <p:ph idx="1" sz="quarter"/>
           </p:nvPr>
         </p:nvSpPr>
         <p:spPr/>
@@ -9560,7 +9619,39 @@
               <a:defRPr/>
             </a:pPr>
             <a:r>
-              <a:t>Kỹ Thuật RL Nâng Cao Cho AGI</a:t>
+              <a:t>Nhiều loài côn trùng ăn thực vật theo nhiều cách khác nhau.</a:t>
+            </a:r>
+          </a:p>
+          <a:p>
+            <a:pPr>
+              <a:defRPr/>
+            </a:pPr>
+            <a:r>
+              <a:t>Gặm nhấm: Ăn lá, thân cây (ví dụ: sâu bướm).</a:t>
+            </a:r>
+          </a:p>
+          <a:p>
+            <a:pPr>
+              <a:defRPr/>
+            </a:pPr>
+            <a:r>
+              <a:t>Hút: Hút nhựa cây (ví dụ: rệp).</a:t>
+            </a:r>
+          </a:p>
+          <a:p>
+            <a:pPr>
+              <a:defRPr/>
+            </a:pPr>
+            <a:r>
+              <a:t>Đào hầm: Tạo đường hầm trong lá (ví dụ: sâu vẽ bùa).</a:t>
+            </a:r>
+          </a:p>
+          <a:p>
+            <a:pPr>
+              <a:defRPr/>
+            </a:pPr>
+            <a:r>
+              <a:t>Ảnh hưởng lớn đến sức khỏe và năng suất cây trồng.</a:t>
             </a:r>
           </a:p>
         </p:txBody>
@@ -9585,7 +9676,75 @@
       <p:grpSpPr/>
       <p:sp>
         <p:nvSpPr>
-          <p:cNvPr id="2" name="Text Placeholder 1"/>
+          <p:cNvPr id="2" name="Picture Placeholder 1"/>
+          <p:cNvSpPr>
+            <a:spLocks noGrp="1"/>
+          </p:cNvSpPr>
+          <p:nvPr>
+            <p:ph type="pic" idx="1" sz="quarter"/>
+          </p:nvPr>
+        </p:nvSpPr>
+        <p:spPr/>
+        <p:txBody>
+          <a:bodyPr/>
+          <a:p>
+            <a:pPr>
+              <a:defRPr/>
+            </a:pPr>
+          </a:p>
+        </p:txBody>
+      </p:sp>
+      <p:sp>
+        <p:nvSpPr>
+          <p:cNvPr id="3" name="Text Placeholder 2"/>
+          <p:cNvSpPr>
+            <a:spLocks noGrp="1"/>
+          </p:cNvSpPr>
+          <p:nvPr>
+            <p:ph type="body" idx="2" sz="quarter"/>
+          </p:nvPr>
+        </p:nvSpPr>
+        <p:spPr/>
+        <p:txBody>
+          <a:bodyPr/>
+          <a:lstStyle/>
+          <a:p>
+            <a:pPr>
+              <a:defRPr/>
+            </a:pPr>
+            <a:r>
+              <a:t>Thực vật tiến hóa các cơ chế phòng thủ để chống lại côn trùng.</a:t>
+            </a:r>
+          </a:p>
+          <a:p>
+            <a:pPr>
+              <a:defRPr/>
+            </a:pPr>
+            <a:r>
+              <a:t>Gai: Ngăn chặn côn trùng ăn (ví dụ: hoa hồng, xương rồng).</a:t>
+            </a:r>
+          </a:p>
+          <a:p>
+            <a:pPr>
+              <a:defRPr/>
+            </a:pPr>
+            <a:r>
+              <a:t>Lông: Cản trở côn trùng di chuyển và ăn (ví dụ: cây tầm ma).</a:t>
+            </a:r>
+          </a:p>
+          <a:p>
+            <a:pPr>
+              <a:defRPr/>
+            </a:pPr>
+            <a:r>
+              <a:t>Lớp sáp: Khó khăn cho côn trùng hút nhựa cây.</a:t>
+            </a:r>
+          </a:p>
+        </p:txBody>
+      </p:sp>
+      <p:sp>
+        <p:nvSpPr>
+          <p:cNvPr id="4" name="Text Placeholder 3"/>
           <p:cNvSpPr>
             <a:spLocks noGrp="1"/>
           </p:cNvSpPr>
@@ -9602,31 +9761,7 @@
               <a:defRPr/>
             </a:pPr>
             <a:r>
-              <a:t>Tương lai của RL và AGI</a:t>
-            </a:r>
-          </a:p>
-        </p:txBody>
-      </p:sp>
-      <p:sp>
-        <p:nvSpPr>
-          <p:cNvPr id="3" name="Title 2"/>
-          <p:cNvSpPr>
-            <a:spLocks noGrp="1"/>
-          </p:cNvSpPr>
-          <p:nvPr>
-            <p:ph type="ctrTitle"/>
-          </p:nvPr>
-        </p:nvSpPr>
-        <p:spPr/>
-        <p:txBody>
-          <a:bodyPr/>
-          <a:lstStyle/>
-          <a:p>
-            <a:pPr>
-              <a:defRPr/>
-            </a:pPr>
-            <a:r>
-              <a:t>05</a:t>
+              <a:t>Tương Tác Giữa Côn Trùng và Thực Vật</a:t>
             </a:r>
           </a:p>
         </p:txBody>
@@ -9649,25 +9784,26 @@
         <p:nvPr/>
       </p:nvGrpSpPr>
       <p:grpSpPr/>
-      <p:pic>
-        <p:nvPicPr>
-          <p:cNvPr id="2" name="Picture Placeholder 1" descr="image.png"/>
-          <p:cNvPicPr>
-            <a:picLocks noGrp="1" noChangeAspect="1"/>
-          </p:cNvPicPr>
+      <p:sp>
+        <p:nvSpPr>
+          <p:cNvPr id="2" name="Picture Placeholder 1"/>
+          <p:cNvSpPr>
+            <a:spLocks noGrp="1"/>
+          </p:cNvSpPr>
           <p:nvPr>
             <p:ph type="pic" idx="1" sz="quarter"/>
           </p:nvPr>
-        </p:nvPicPr>
-        <p:blipFill>
-          <a:blip r:embed="rId2"/>
-          <a:srcRect t="28" b="28"/>
-          <a:stretch>
-            <a:fillRect/>
-          </a:stretch>
-        </p:blipFill>
+        </p:nvSpPr>
         <p:spPr/>
-      </p:pic>
+        <p:txBody>
+          <a:bodyPr/>
+          <a:p>
+            <a:pPr>
+              <a:defRPr/>
+            </a:pPr>
+          </a:p>
+        </p:txBody>
+      </p:sp>
       <p:sp>
         <p:nvSpPr>
           <p:cNvPr id="3" name="Text Placeholder 2"/>
@@ -9687,31 +9823,31 @@
               <a:defRPr/>
             </a:pPr>
             <a:r>
-              <a:t>Thuật toán RL hiệu quả hơn, meta-learning.</a:t>
-            </a:r>
-          </a:p>
-          <a:p>
-            <a:pPr>
-              <a:defRPr/>
-            </a:pPr>
-            <a:r>
-              <a:t>Khám phá và khai thác hiệu quả.</a:t>
-            </a:r>
-          </a:p>
-          <a:p>
-            <a:pPr>
-              <a:defRPr/>
-            </a:pPr>
-            <a:r>
-              <a:t>RL phân cấp cho tác vụ phức tạp.</a:t>
-            </a:r>
-          </a:p>
-          <a:p>
-            <a:pPr>
-              <a:defRPr/>
-            </a:pPr>
-            <a:r>
-              <a:t>RL thích ứng, chuyển giao kiến thức tốt.</a:t>
+              <a:t>Thực vật sản xuất các hợp chất hóa học để chống lại côn trùng.</a:t>
+            </a:r>
+          </a:p>
+          <a:p>
+            <a:pPr>
+              <a:defRPr/>
+            </a:pPr>
+            <a:r>
+              <a:t>Chất độc: Gây hại hoặc giết chết côn trùng (ví dụ: nicotine trong thuốc lá).</a:t>
+            </a:r>
+          </a:p>
+          <a:p>
+            <a:pPr>
+              <a:defRPr/>
+            </a:pPr>
+            <a:r>
+              <a:t>Chất xua đuổi: Ngăn chặn côn trùng đến gần (ví dụ: pyrethrin trong cúc vạn thọ).</a:t>
+            </a:r>
+          </a:p>
+          <a:p>
+            <a:pPr>
+              <a:defRPr/>
+            </a:pPr>
+            <a:r>
+              <a:t>Hợp chất dễ bay hơi: Thu hút kẻ thù của côn trùng gây hại.</a:t>
             </a:r>
           </a:p>
         </p:txBody>
@@ -9735,7 +9871,7 @@
               <a:defRPr/>
             </a:pPr>
             <a:r>
-              <a:t>Đột phá tiềm năng trong RL</a:t>
+              <a:t>Tương Tác Giữa Côn Trùng và Thực Vật</a:t>
             </a:r>
           </a:p>
         </p:txBody>
@@ -9758,25 +9894,26 @@
         <p:nvPr/>
       </p:nvGrpSpPr>
       <p:grpSpPr/>
-      <p:pic>
-        <p:nvPicPr>
-          <p:cNvPr id="2" name="Picture Placeholder 1" descr="image.jpg"/>
-          <p:cNvPicPr>
-            <a:picLocks noGrp="1" noChangeAspect="1"/>
-          </p:cNvPicPr>
+      <p:sp>
+        <p:nvSpPr>
+          <p:cNvPr id="2" name="Picture Placeholder 1"/>
+          <p:cNvSpPr>
+            <a:spLocks noGrp="1"/>
+          </p:cNvSpPr>
           <p:nvPr>
             <p:ph type="pic" idx="1" sz="quarter"/>
           </p:nvPr>
-        </p:nvPicPr>
-        <p:blipFill>
-          <a:blip r:embed="rId2"/>
-          <a:srcRect t="16" b="16"/>
-          <a:stretch>
-            <a:fillRect/>
-          </a:stretch>
-        </p:blipFill>
+        </p:nvSpPr>
         <p:spPr/>
-      </p:pic>
+        <p:txBody>
+          <a:bodyPr/>
+          <a:p>
+            <a:pPr>
+              <a:defRPr/>
+            </a:pPr>
+          </a:p>
+        </p:txBody>
+      </p:sp>
       <p:sp>
         <p:nvSpPr>
           <p:cNvPr id="3" name="Text Placeholder 2"/>
@@ -9796,31 +9933,31 @@
               <a:defRPr/>
             </a:pPr>
             <a:r>
-              <a:t>AI thể hiện tương tác thế giới thực.</a:t>
-            </a:r>
-          </a:p>
-          <a:p>
-            <a:pPr>
-              <a:defRPr/>
-            </a:pPr>
-            <a:r>
-              <a:t>Robot học và thích nghi qua RL.</a:t>
-            </a:r>
-          </a:p>
-          <a:p>
-            <a:pPr>
-              <a:defRPr/>
-            </a:pPr>
-            <a:r>
-              <a:t>Môi trường mô phỏng huấn luyện RL.</a:t>
-            </a:r>
-          </a:p>
-          <a:p>
-            <a:pPr>
-              <a:defRPr/>
-            </a:pPr>
-            <a:r>
-              <a:t>RL điều khiển robot thực hiện tác vụ.</a:t>
+              <a:t>Côn trùng thụ phấn quan trọng.</a:t>
+            </a:r>
+          </a:p>
+          <a:p>
+            <a:pPr>
+              <a:defRPr/>
+            </a:pPr>
+            <a:r>
+              <a:t>Ong: Thụ phấn cây trồng, hoa.</a:t>
+            </a:r>
+          </a:p>
+          <a:p>
+            <a:pPr>
+              <a:defRPr/>
+            </a:pPr>
+            <a:r>
+              <a:t>Bướm: Thụ phấn hoa sặc sỡ.</a:t>
+            </a:r>
+          </a:p>
+          <a:p>
+            <a:pPr>
+              <a:defRPr/>
+            </a:pPr>
+            <a:r>
+              <a:t>Ruồi, bọ cánh cứng thụ phấn.</a:t>
             </a:r>
           </a:p>
         </p:txBody>
@@ -9844,7 +9981,7 @@
               <a:defRPr/>
             </a:pPr>
             <a:r>
-              <a:t>Vai trò của AI và Robotics</a:t>
+              <a:t>Tương Tác Giữa Côn Trùng và Thực Vật</a:t>
             </a:r>
           </a:p>
         </p:txBody>
@@ -9867,33 +10004,38 @@
         <p:nvPr/>
       </p:nvGrpSpPr>
       <p:grpSpPr/>
-      <p:pic>
-        <p:nvPicPr>
-          <p:cNvPr id="2" name="Picture Placeholder 1" descr="image.png"/>
-          <p:cNvPicPr>
-            <a:picLocks noGrp="1" noChangeAspect="1"/>
-          </p:cNvPicPr>
-          <p:nvPr>
-            <p:ph type="pic" idx="1" sz="quarter"/>
-          </p:nvPr>
-        </p:nvPicPr>
-        <p:blipFill>
-          <a:blip r:embed="rId2"/>
-          <a:srcRect t="0" b="0"/>
-          <a:stretch>
-            <a:fillRect/>
-          </a:stretch>
-        </p:blipFill>
+      <p:sp>
+        <p:nvSpPr>
+          <p:cNvPr id="2" name="Text Placeholder 1"/>
+          <p:cNvSpPr>
+            <a:spLocks noGrp="1"/>
+          </p:cNvSpPr>
+          <p:nvPr>
+            <p:ph type="body" idx="15" sz="quarter"/>
+          </p:nvPr>
+        </p:nvSpPr>
         <p:spPr/>
-      </p:pic>
-      <p:sp>
-        <p:nvSpPr>
-          <p:cNvPr id="3" name="Text Placeholder 2"/>
-          <p:cNvSpPr>
-            <a:spLocks noGrp="1"/>
-          </p:cNvSpPr>
-          <p:nvPr>
-            <p:ph type="body" idx="2" sz="quarter"/>
+        <p:txBody>
+          <a:bodyPr/>
+          <a:lstStyle/>
+          <a:p>
+            <a:pPr>
+              <a:defRPr/>
+            </a:pPr>
+            <a:r>
+              <a:t>Tương Tác Giữa Côn Trùng và Thực Vật</a:t>
+            </a:r>
+          </a:p>
+        </p:txBody>
+      </p:sp>
+      <p:sp>
+        <p:nvSpPr>
+          <p:cNvPr id="3" name="Title 2"/>
+          <p:cNvSpPr>
+            <a:spLocks noGrp="1"/>
+          </p:cNvSpPr>
+          <p:nvPr>
+            <p:ph type="title"/>
           </p:nvPr>
         </p:nvSpPr>
         <p:spPr/>
@@ -9905,43 +10047,19 @@
               <a:defRPr/>
             </a:pPr>
             <a:r>
-              <a:t>RL + NLP: Tác nhân đối thoại thông minh.</a:t>
-            </a:r>
-          </a:p>
-          <a:p>
-            <a:pPr>
-              <a:defRPr/>
-            </a:pPr>
-            <a:r>
-              <a:t>RL + CV: Điều khiển robot dựa trên ảnh.</a:t>
-            </a:r>
-          </a:p>
-          <a:p>
-            <a:pPr>
-              <a:defRPr/>
-            </a:pPr>
-            <a:r>
-              <a:t>RL + Deep Learning: Mô hình mạnh mẽ hơn.</a:t>
-            </a:r>
-          </a:p>
-          <a:p>
-            <a:pPr>
-              <a:defRPr/>
-            </a:pPr>
-            <a:r>
-              <a:t>Hợp tác AI hướng tới AGI, ứng dụng rộng.</a:t>
-            </a:r>
-          </a:p>
-        </p:txBody>
-      </p:sp>
-      <p:sp>
-        <p:nvSpPr>
-          <p:cNvPr id="4" name="Text Placeholder 3"/>
-          <p:cNvSpPr>
-            <a:spLocks noGrp="1"/>
-          </p:cNvSpPr>
-          <p:nvPr>
-            <p:ph type="body" idx="15" sz="quarter"/>
+              <a:t>Tiến Hóa Chung: Hoa và Côn Trùng</a:t>
+            </a:r>
+          </a:p>
+        </p:txBody>
+      </p:sp>
+      <p:sp>
+        <p:nvSpPr>
+          <p:cNvPr id="4" name="Content Placeholder 3"/>
+          <p:cNvSpPr>
+            <a:spLocks noGrp="1"/>
+          </p:cNvSpPr>
+          <p:nvPr>
+            <p:ph idx="1" sz="half"/>
           </p:nvPr>
         </p:nvSpPr>
         <p:spPr/>
@@ -9953,7 +10071,87 @@
               <a:defRPr/>
             </a:pPr>
             <a:r>
-              <a:t>Hội tụ RL và các lĩnh vực AI</a:t>
+              <a:t>Hoa và côn trùng đã tiến hóa cùng nhau.</a:t>
+            </a:r>
+          </a:p>
+        </p:txBody>
+      </p:sp>
+      <p:sp>
+        <p:nvSpPr>
+          <p:cNvPr id="5" name="Content Placeholder 4"/>
+          <p:cNvSpPr>
+            <a:spLocks noGrp="1"/>
+          </p:cNvSpPr>
+          <p:nvPr>
+            <p:ph idx="3" sz="half"/>
+          </p:nvPr>
+        </p:nvSpPr>
+        <p:spPr/>
+        <p:txBody>
+          <a:bodyPr/>
+          <a:lstStyle/>
+          <a:p>
+            <a:pPr>
+              <a:defRPr/>
+            </a:pPr>
+            <a:r>
+              <a:t>Hình dạng hoa: Phù hợp với hình dạng cơ thể của côn trùng thụ phấn.</a:t>
+            </a:r>
+          </a:p>
+        </p:txBody>
+      </p:sp>
+      <p:sp>
+        <p:nvSpPr>
+          <p:cNvPr id="6" name="Content Placeholder 5"/>
+          <p:cNvSpPr>
+            <a:spLocks noGrp="1"/>
+          </p:cNvSpPr>
+          <p:nvPr>
+            <p:ph idx="2" sz="half"/>
+          </p:nvPr>
+        </p:nvSpPr>
+        <p:spPr/>
+        <p:txBody>
+          <a:bodyPr/>
+          <a:lstStyle/>
+          <a:p>
+            <a:pPr>
+              <a:defRPr/>
+            </a:pPr>
+            <a:r>
+              <a:t>Màu sắc hoa: Thu hút các loài côn trùng thụ phấn cụ thể.</a:t>
+            </a:r>
+          </a:p>
+        </p:txBody>
+      </p:sp>
+      <p:sp>
+        <p:nvSpPr>
+          <p:cNvPr id="7" name="Content Placeholder 6"/>
+          <p:cNvSpPr>
+            <a:spLocks noGrp="1"/>
+          </p:cNvSpPr>
+          <p:nvPr>
+            <p:ph idx="4" sz="half"/>
+          </p:nvPr>
+        </p:nvSpPr>
+        <p:spPr/>
+        <p:txBody>
+          <a:bodyPr/>
+          <a:lstStyle/>
+          <a:p>
+            <a:pPr>
+              <a:defRPr/>
+            </a:pPr>
+            <a:r>
+              <a:t>Mùi hương hoa: Dẫn dụ côn trùng từ xa.</a:t>
+            </a:r>
+          </a:p>
+          <a:p>
+            <a:pPr>
+              <a:defRPr/>
+            </a:pPr>
+            <a:r>
+              <a:t>Ví dụ: Hoa lan và ong bắp cày.</a:t>
             </a:r>
           </a:p>
         </p:txBody>
@@ -9995,7 +10193,7 @@
               <a:defRPr/>
             </a:pPr>
             <a:r>
-              <a:t>Nội dung chương trình</a:t>
+              <a:t>Nội dung chính của bài thuyết trình</a:t>
             </a:r>
           </a:p>
         </p:txBody>
@@ -10019,55 +10217,39 @@
               <a:defRPr/>
             </a:pPr>
             <a:r>
-              <a:t>Giới thiệu về Học Tăng Cường (Reinforcement Learning)</a:t>
-            </a:r>
-          </a:p>
-          <a:p>
-            <a:pPr>
-              <a:defRPr/>
-            </a:pPr>
-            <a:r>
-              <a:t>Thành công và Hạn chế của RL</a:t>
-            </a:r>
-          </a:p>
-          <a:p>
-            <a:pPr>
-              <a:defRPr/>
-            </a:pPr>
-            <a:r>
-              <a:t>RL cho AGI: Thách thức và Cơ hội</a:t>
-            </a:r>
-          </a:p>
-          <a:p>
-            <a:pPr>
-              <a:defRPr/>
-            </a:pPr>
-            <a:r>
-              <a:t>Các Kỹ thuật RL Nâng cao cho AGI</a:t>
-            </a:r>
-          </a:p>
-          <a:p>
-            <a:pPr>
-              <a:defRPr/>
-            </a:pPr>
-            <a:r>
-              <a:t>Tương lai của RL và AGI</a:t>
-            </a:r>
-          </a:p>
-          <a:p>
-            <a:pPr>
-              <a:defRPr/>
-            </a:pPr>
-            <a:r>
-              <a:t>Kết luận</a:t>
-            </a:r>
-          </a:p>
-          <a:p>
-            <a:pPr>
-              <a:defRPr/>
-            </a:pPr>
-            <a:r>
-              <a:t>Hỏi &amp; Đáp</a:t>
+              <a:t>Giới thiệu về sự đa dạng và tầm quan trọng của côn trùng</a:t>
+            </a:r>
+          </a:p>
+          <a:p>
+            <a:pPr>
+              <a:defRPr/>
+            </a:pPr>
+            <a:r>
+              <a:t>Hành vi giao tiếp và xã hội của côn trùng</a:t>
+            </a:r>
+          </a:p>
+          <a:p>
+            <a:pPr>
+              <a:defRPr/>
+            </a:pPr>
+            <a:r>
+              <a:t>Tương tác giữa côn trùng và thực vật</a:t>
+            </a:r>
+          </a:p>
+          <a:p>
+            <a:pPr>
+              <a:defRPr/>
+            </a:pPr>
+            <a:r>
+              <a:t>Vai trò của côn trùng trong hệ sinh thái</a:t>
+            </a:r>
+          </a:p>
+          <a:p>
+            <a:pPr>
+              <a:defRPr/>
+            </a:pPr>
+            <a:r>
+              <a:t>Bảo tồn và tương lai của côn trùng</a:t>
             </a:r>
           </a:p>
         </p:txBody>
@@ -10092,36 +10274,80 @@
       <p:grpSpPr/>
       <p:sp>
         <p:nvSpPr>
-          <p:cNvPr id="2" name="Title 1"/>
-          <p:cNvSpPr>
-            <a:spLocks noGrp="1"/>
-          </p:cNvSpPr>
-          <p:nvPr>
-            <p:ph type="ctrTitle"/>
+          <p:cNvPr id="2" name="Picture Placeholder 1"/>
+          <p:cNvSpPr>
+            <a:spLocks noGrp="1"/>
+          </p:cNvSpPr>
+          <p:nvPr>
+            <p:ph type="pic" idx="1" sz="quarter"/>
           </p:nvPr>
         </p:nvSpPr>
         <p:spPr/>
         <p:txBody>
           <a:bodyPr/>
+          <a:p>
+            <a:pPr>
+              <a:defRPr/>
+            </a:pPr>
+          </a:p>
+        </p:txBody>
+      </p:sp>
+      <p:sp>
+        <p:nvSpPr>
+          <p:cNvPr id="3" name="Text Placeholder 2"/>
+          <p:cNvSpPr>
+            <a:spLocks noGrp="1"/>
+          </p:cNvSpPr>
+          <p:nvPr>
+            <p:ph type="body" idx="2" sz="quarter"/>
+          </p:nvPr>
+        </p:nvSpPr>
+        <p:spPr/>
+        <p:txBody>
+          <a:bodyPr/>
           <a:lstStyle/>
           <a:p>
             <a:pPr>
               <a:defRPr/>
             </a:pPr>
             <a:r>
-              <a:t>Tổng Kết: Học Tăng Cường</a:t>
-            </a:r>
-          </a:p>
-        </p:txBody>
-      </p:sp>
-      <p:sp>
-        <p:nvSpPr>
-          <p:cNvPr id="3" name="Text Placeholder 2"/>
-          <p:cNvSpPr>
-            <a:spLocks noGrp="1"/>
-          </p:cNvSpPr>
-          <p:nvPr>
-            <p:ph type="body" idx="1" sz="quarter"/>
+              <a:t>Côn trùng và thực vật cùng có lợi.</a:t>
+            </a:r>
+          </a:p>
+          <a:p>
+            <a:pPr>
+              <a:defRPr/>
+            </a:pPr>
+            <a:r>
+              <a:t>Kiến bảo vệ cây, cây cho kiến ở, ăn.</a:t>
+            </a:r>
+          </a:p>
+          <a:p>
+            <a:pPr>
+              <a:defRPr/>
+            </a:pPr>
+            <a:r>
+              <a:t>Ví dụ: Cây keo và kiến Acacia.</a:t>
+            </a:r>
+          </a:p>
+          <a:p>
+            <a:pPr>
+              <a:defRPr/>
+            </a:pPr>
+            <a:r>
+              <a:t>Giảm 50% thiệt hại do côn trùng.</a:t>
+            </a:r>
+          </a:p>
+        </p:txBody>
+      </p:sp>
+      <p:sp>
+        <p:nvSpPr>
+          <p:cNvPr id="4" name="Text Placeholder 3"/>
+          <p:cNvSpPr>
+            <a:spLocks noGrp="1"/>
+          </p:cNvSpPr>
+          <p:nvPr>
+            <p:ph type="body" idx="15" sz="quarter"/>
           </p:nvPr>
         </p:nvSpPr>
         <p:spPr/>
@@ -10133,39 +10359,7 @@
               <a:defRPr/>
             </a:pPr>
             <a:r>
-              <a:t>Học tăng cường (RL) mạnh mẽ phát triển tác nhân.</a:t>
-            </a:r>
-          </a:p>
-          <a:p>
-            <a:pPr>
-              <a:defRPr/>
-            </a:pPr>
-            <a:r>
-              <a:t>RL thành công ở nhiều lĩnh vực: game, robot...</a:t>
-            </a:r>
-          </a:p>
-          <a:p>
-            <a:pPr>
-              <a:defRPr/>
-            </a:pPr>
-            <a:r>
-              <a:t>Nhưng còn thách thức để RL đạt được AGI.</a:t>
-            </a:r>
-          </a:p>
-          <a:p>
-            <a:pPr>
-              <a:defRPr/>
-            </a:pPr>
-            <a:r>
-              <a:t>Keywords: Reinforcement Learning, AGI...</a:t>
-            </a:r>
-          </a:p>
-          <a:p>
-            <a:pPr>
-              <a:defRPr/>
-            </a:pPr>
-            <a:r>
-              <a:t>Diagram: RL -&gt; Intelligent Agents -&gt; AGI</a:t>
+              <a:t>Tương Tác Giữa Côn Trùng và Thực Vật</a:t>
             </a:r>
           </a:p>
         </p:txBody>
@@ -10190,7 +10384,31 @@
       <p:grpSpPr/>
       <p:sp>
         <p:nvSpPr>
-          <p:cNvPr id="2" name="Title 1"/>
+          <p:cNvPr id="2" name="Text Placeholder 1"/>
+          <p:cNvSpPr>
+            <a:spLocks noGrp="1"/>
+          </p:cNvSpPr>
+          <p:nvPr>
+            <p:ph type="body" idx="15" sz="quarter"/>
+          </p:nvPr>
+        </p:nvSpPr>
+        <p:spPr/>
+        <p:txBody>
+          <a:bodyPr/>
+          <a:lstStyle/>
+          <a:p>
+            <a:pPr>
+              <a:defRPr/>
+            </a:pPr>
+            <a:r>
+              <a:t>Vai Trò Của Côn Trùng Trong Hệ Sinh Thái</a:t>
+            </a:r>
+          </a:p>
+        </p:txBody>
+      </p:sp>
+      <p:sp>
+        <p:nvSpPr>
+          <p:cNvPr id="3" name="Title 2"/>
           <p:cNvSpPr>
             <a:spLocks noGrp="1"/>
           </p:cNvSpPr>
@@ -10207,63 +10425,7 @@
               <a:defRPr/>
             </a:pPr>
             <a:r>
-              <a:t>Hướng Tới Tương Lai AGI</a:t>
-            </a:r>
-          </a:p>
-        </p:txBody>
-      </p:sp>
-      <p:sp>
-        <p:nvSpPr>
-          <p:cNvPr id="3" name="Text Placeholder 2"/>
-          <p:cNvSpPr>
-            <a:spLocks noGrp="1"/>
-          </p:cNvSpPr>
-          <p:nvPr>
-            <p:ph type="body" idx="1" sz="quarter"/>
-          </p:nvPr>
-        </p:nvSpPr>
-        <p:spPr/>
-        <p:txBody>
-          <a:bodyPr/>
-          <a:lstStyle/>
-          <a:p>
-            <a:pPr>
-              <a:defRPr/>
-            </a:pPr>
-            <a:r>
-              <a:t>Kỹ thuật RL tiên tiến và hợp tác liên ngành.</a:t>
-            </a:r>
-          </a:p>
-          <a:p>
-            <a:pPr>
-              <a:defRPr/>
-            </a:pPr>
-            <a:r>
-              <a:t>Tương lai AGI phụ thuộc vào tiến bộ của RL.</a:t>
-            </a:r>
-          </a:p>
-          <a:p>
-            <a:pPr>
-              <a:defRPr/>
-            </a:pPr>
-            <a:r>
-              <a:t>Nghiên cứu để khai thác tiềm năng của RL.</a:t>
-            </a:r>
-          </a:p>
-          <a:p>
-            <a:pPr>
-              <a:defRPr/>
-            </a:pPr>
-            <a:r>
-              <a:t>Keywords: Advanced RL Techniques...</a:t>
-            </a:r>
-          </a:p>
-          <a:p>
-            <a:pPr>
-              <a:defRPr/>
-            </a:pPr>
-            <a:r>
-              <a:t>Image: diverse group of researchers...</a:t>
+              <a:t>04</a:t>
             </a:r>
           </a:p>
         </p:txBody>
@@ -10288,36 +10450,72 @@
       <p:grpSpPr/>
       <p:sp>
         <p:nvSpPr>
-          <p:cNvPr id="2" name="Title 1"/>
-          <p:cNvSpPr>
-            <a:spLocks noGrp="1"/>
-          </p:cNvSpPr>
-          <p:nvPr>
-            <p:ph type="ctrTitle"/>
+          <p:cNvPr id="2" name="Picture Placeholder 1"/>
+          <p:cNvSpPr>
+            <a:spLocks noGrp="1"/>
+          </p:cNvSpPr>
+          <p:nvPr>
+            <p:ph type="pic" idx="10" sz="quarter"/>
           </p:nvPr>
         </p:nvSpPr>
         <p:spPr/>
         <p:txBody>
           <a:bodyPr/>
+          <a:p>
+            <a:pPr>
+              <a:defRPr/>
+            </a:pPr>
+          </a:p>
+        </p:txBody>
+      </p:sp>
+      <p:sp>
+        <p:nvSpPr>
+          <p:cNvPr id="3" name="Text Placeholder 2"/>
+          <p:cNvSpPr>
+            <a:spLocks noGrp="1"/>
+          </p:cNvSpPr>
+          <p:nvPr>
+            <p:ph type="body" idx="2" sz="quarter"/>
+          </p:nvPr>
+        </p:nvSpPr>
+        <p:spPr/>
+        <p:txBody>
+          <a:bodyPr/>
           <a:lstStyle/>
           <a:p>
             <a:pPr>
               <a:defRPr/>
             </a:pPr>
             <a:r>
-              <a:t>Cảm ơn và Hỏi đáp</a:t>
-            </a:r>
-          </a:p>
-        </p:txBody>
-      </p:sp>
-      <p:sp>
-        <p:nvSpPr>
-          <p:cNvPr id="3" name="Text Placeholder 2"/>
-          <p:cNvSpPr>
-            <a:spLocks noGrp="1"/>
-          </p:cNvSpPr>
-          <p:nvPr>
-            <p:ph type="body" idx="1" sz="quarter"/>
+              <a:t>Côn trùng và vi sinh vật phân hủy chất hữu cơ.</a:t>
+            </a:r>
+          </a:p>
+          <a:p>
+            <a:pPr>
+              <a:defRPr/>
+            </a:pPr>
+            <a:r>
+              <a:t>Quá trình này giải phóng các chất dinh dưỡng quan trọng.</a:t>
+            </a:r>
+          </a:p>
+          <a:p>
+            <a:pPr>
+              <a:defRPr/>
+            </a:pPr>
+            <a:r>
+              <a:t>Ví dụ: Bọ hung (Dung Beetles) tăng 20% chu trình dinh dưỡng trong đất.</a:t>
+            </a:r>
+          </a:p>
+        </p:txBody>
+      </p:sp>
+      <p:sp>
+        <p:nvSpPr>
+          <p:cNvPr id="4" name="Text Placeholder 3"/>
+          <p:cNvSpPr>
+            <a:spLocks noGrp="1"/>
+          </p:cNvSpPr>
+          <p:nvPr>
+            <p:ph type="body" idx="15" sz="quarter"/>
           </p:nvPr>
         </p:nvSpPr>
         <p:spPr/>
@@ -10329,15 +10527,7 @@
               <a:defRPr/>
             </a:pPr>
             <a:r>
-              <a:t>Xin chân thành cảm ơn sự chú ý của quý vị.</a:t>
-            </a:r>
-          </a:p>
-          <a:p>
-            <a:pPr>
-              <a:defRPr/>
-            </a:pPr>
-            <a:r>
-              <a:t>Chúng tôi rất vui được trả lời các câu hỏi của quý vị.</a:t>
+              <a:t>Phân Hủy: Làm Sạch Môi Trường</a:t>
             </a:r>
           </a:p>
         </p:txBody>
@@ -10362,7 +10552,549 @@
       <p:grpSpPr/>
       <p:sp>
         <p:nvSpPr>
-          <p:cNvPr id="2" name="Title 1"/>
+          <p:cNvPr id="2" name="Picture Placeholder 1"/>
+          <p:cNvSpPr>
+            <a:spLocks noGrp="1"/>
+          </p:cNvSpPr>
+          <p:nvPr>
+            <p:ph type="pic" idx="10" sz="quarter"/>
+          </p:nvPr>
+        </p:nvSpPr>
+        <p:spPr/>
+        <p:txBody>
+          <a:bodyPr/>
+          <a:p>
+            <a:pPr>
+              <a:defRPr/>
+            </a:pPr>
+          </a:p>
+        </p:txBody>
+      </p:sp>
+      <p:sp>
+        <p:nvSpPr>
+          <p:cNvPr id="3" name="Text Placeholder 2"/>
+          <p:cNvSpPr>
+            <a:spLocks noGrp="1"/>
+          </p:cNvSpPr>
+          <p:nvPr>
+            <p:ph type="body" idx="2" sz="quarter"/>
+          </p:nvPr>
+        </p:nvSpPr>
+        <p:spPr/>
+        <p:txBody>
+          <a:bodyPr/>
+          <a:lstStyle/>
+          <a:p>
+            <a:pPr>
+              <a:defRPr/>
+            </a:pPr>
+            <a:r>
+              <a:t>Côn trùng giúp giải phóng dinh dưỡng vào đất.</a:t>
+            </a:r>
+          </a:p>
+          <a:p>
+            <a:pPr>
+              <a:defRPr/>
+            </a:pPr>
+            <a:r>
+              <a:t>Các chất dinh dưỡng này nuôi cây trồng và các sinh vật khác.</a:t>
+            </a:r>
+          </a:p>
+          <a:p>
+            <a:pPr>
+              <a:defRPr/>
+            </a:pPr>
+            <a:r>
+              <a:t>Ví dụ: Termites ( mối ) xây tổ giúp cải tạo đất.</a:t>
+            </a:r>
+          </a:p>
+        </p:txBody>
+      </p:sp>
+      <p:sp>
+        <p:nvSpPr>
+          <p:cNvPr id="4" name="Text Placeholder 3"/>
+          <p:cNvSpPr>
+            <a:spLocks noGrp="1"/>
+          </p:cNvSpPr>
+          <p:nvPr>
+            <p:ph type="body" idx="15" sz="quarter"/>
+          </p:nvPr>
+        </p:nvSpPr>
+        <p:spPr/>
+        <p:txBody>
+          <a:bodyPr/>
+          <a:lstStyle/>
+          <a:p>
+            <a:pPr>
+              <a:defRPr/>
+            </a:pPr>
+            <a:r>
+              <a:t>Chu Trình Dinh Dưỡng: Sự Sống Cho Đất</a:t>
+            </a:r>
+          </a:p>
+        </p:txBody>
+      </p:sp>
+    </p:spTree>
+  </p:cSld>
+  <p:clrMapOvr>
+    <a:masterClrMapping/>
+  </p:clrMapOvr>
+</p:sld>
+</file>
+
+<file path=ppt/slides/slide24.xml><?xml version="1.0" encoding="utf-8"?>
+<p:sld xmlns:a="http://schemas.openxmlformats.org/drawingml/2006/main" xmlns:p="http://schemas.openxmlformats.org/presentationml/2006/main" xmlns:r="http://schemas.openxmlformats.org/officeDocument/2006/relationships">
+  <p:cSld>
+    <p:spTree>
+      <p:nvGrpSpPr>
+        <p:cNvPr id="1" name=""/>
+        <p:cNvGrpSpPr/>
+        <p:nvPr/>
+      </p:nvGrpSpPr>
+      <p:grpSpPr/>
+      <p:sp>
+        <p:nvSpPr>
+          <p:cNvPr id="2" name="Picture Placeholder 1"/>
+          <p:cNvSpPr>
+            <a:spLocks noGrp="1"/>
+          </p:cNvSpPr>
+          <p:nvPr>
+            <p:ph type="pic" idx="10" sz="quarter"/>
+          </p:nvPr>
+        </p:nvSpPr>
+        <p:spPr/>
+        <p:txBody>
+          <a:bodyPr/>
+          <a:p>
+            <a:pPr>
+              <a:defRPr/>
+            </a:pPr>
+          </a:p>
+        </p:txBody>
+      </p:sp>
+      <p:sp>
+        <p:nvSpPr>
+          <p:cNvPr id="3" name="Text Placeholder 2"/>
+          <p:cNvSpPr>
+            <a:spLocks noGrp="1"/>
+          </p:cNvSpPr>
+          <p:nvPr>
+            <p:ph type="body" idx="2" sz="quarter"/>
+          </p:nvPr>
+        </p:nvSpPr>
+        <p:spPr/>
+        <p:txBody>
+          <a:bodyPr/>
+          <a:lstStyle/>
+          <a:p>
+            <a:pPr>
+              <a:defRPr/>
+            </a:pPr>
+            <a:r>
+              <a:t>Côn trùng là nguồn thức ăn cho nhiều loài động vật khác.</a:t>
+            </a:r>
+          </a:p>
+          <a:p>
+            <a:pPr>
+              <a:defRPr/>
+            </a:pPr>
+            <a:r>
+              <a:t>Chim, bò sát, lưỡng cư và động vật có vú đều ăn côn trùng.</a:t>
+            </a:r>
+          </a:p>
+          <a:p>
+            <a:pPr>
+              <a:defRPr/>
+            </a:pPr>
+            <a:r>
+              <a:t>Ví dụ: Sâu bướm là thức ăn quan trọng cho chim non.</a:t>
+            </a:r>
+          </a:p>
+        </p:txBody>
+      </p:sp>
+      <p:sp>
+        <p:nvSpPr>
+          <p:cNvPr id="4" name="Text Placeholder 3"/>
+          <p:cNvSpPr>
+            <a:spLocks noGrp="1"/>
+          </p:cNvSpPr>
+          <p:nvPr>
+            <p:ph type="body" idx="15" sz="quarter"/>
+          </p:nvPr>
+        </p:nvSpPr>
+        <p:spPr/>
+        <p:txBody>
+          <a:bodyPr/>
+          <a:lstStyle/>
+          <a:p>
+            <a:pPr>
+              <a:defRPr/>
+            </a:pPr>
+            <a:r>
+              <a:t>Lưới Thức Ăn: Nguồn Sống Quan Trọng</a:t>
+            </a:r>
+          </a:p>
+        </p:txBody>
+      </p:sp>
+    </p:spTree>
+  </p:cSld>
+  <p:clrMapOvr>
+    <a:masterClrMapping/>
+  </p:clrMapOvr>
+</p:sld>
+</file>
+
+<file path=ppt/slides/slide25.xml><?xml version="1.0" encoding="utf-8"?>
+<p:sld xmlns:a="http://schemas.openxmlformats.org/drawingml/2006/main" xmlns:p="http://schemas.openxmlformats.org/presentationml/2006/main" xmlns:r="http://schemas.openxmlformats.org/officeDocument/2006/relationships">
+  <p:cSld>
+    <p:spTree>
+      <p:nvGrpSpPr>
+        <p:cNvPr id="1" name=""/>
+        <p:cNvGrpSpPr/>
+        <p:nvPr/>
+      </p:nvGrpSpPr>
+      <p:grpSpPr/>
+      <p:sp>
+        <p:nvSpPr>
+          <p:cNvPr id="2" name="Picture Placeholder 1"/>
+          <p:cNvSpPr>
+            <a:spLocks noGrp="1"/>
+          </p:cNvSpPr>
+          <p:nvPr>
+            <p:ph type="pic" idx="10" sz="quarter"/>
+          </p:nvPr>
+        </p:nvSpPr>
+        <p:spPr/>
+        <p:txBody>
+          <a:bodyPr/>
+          <a:p>
+            <a:pPr>
+              <a:defRPr/>
+            </a:pPr>
+          </a:p>
+        </p:txBody>
+      </p:sp>
+      <p:sp>
+        <p:nvSpPr>
+          <p:cNvPr id="3" name="Text Placeholder 2"/>
+          <p:cNvSpPr>
+            <a:spLocks noGrp="1"/>
+          </p:cNvSpPr>
+          <p:nvPr>
+            <p:ph type="body" idx="2" sz="quarter"/>
+          </p:nvPr>
+        </p:nvSpPr>
+        <p:spPr/>
+        <p:txBody>
+          <a:bodyPr/>
+          <a:lstStyle/>
+          <a:p>
+            <a:pPr>
+              <a:defRPr/>
+            </a:pPr>
+            <a:r>
+              <a:t>Một số loài côn trùng thay đổi môi trường sống của chúng.</a:t>
+            </a:r>
+          </a:p>
+          <a:p>
+            <a:pPr>
+              <a:defRPr/>
+            </a:pPr>
+            <a:r>
+              <a:t>Ví dụ: Mối xây tổ, ong làm tổ, kiến tạo đường đi.</a:t>
+            </a:r>
+          </a:p>
+          <a:p>
+            <a:pPr>
+              <a:defRPr/>
+            </a:pPr>
+            <a:r>
+              <a:t>Những thay đổi này ảnh hưởng đến các loài khác.</a:t>
+            </a:r>
+          </a:p>
+        </p:txBody>
+      </p:sp>
+      <p:sp>
+        <p:nvSpPr>
+          <p:cNvPr id="4" name="Text Placeholder 3"/>
+          <p:cNvSpPr>
+            <a:spLocks noGrp="1"/>
+          </p:cNvSpPr>
+          <p:nvPr>
+            <p:ph type="body" idx="15" sz="quarter"/>
+          </p:nvPr>
+        </p:nvSpPr>
+        <p:spPr/>
+        <p:txBody>
+          <a:bodyPr/>
+          <a:lstStyle/>
+          <a:p>
+            <a:pPr>
+              <a:defRPr/>
+            </a:pPr>
+            <a:r>
+              <a:t>Kỹ Sư Hệ Sinh Thái: Thay Đổi Môi Trường</a:t>
+            </a:r>
+          </a:p>
+        </p:txBody>
+      </p:sp>
+    </p:spTree>
+  </p:cSld>
+  <p:clrMapOvr>
+    <a:masterClrMapping/>
+  </p:clrMapOvr>
+</p:sld>
+</file>
+
+<file path=ppt/slides/slide26.xml><?xml version="1.0" encoding="utf-8"?>
+<p:sld xmlns:a="http://schemas.openxmlformats.org/drawingml/2006/main" xmlns:p="http://schemas.openxmlformats.org/presentationml/2006/main" xmlns:r="http://schemas.openxmlformats.org/officeDocument/2006/relationships">
+  <p:cSld>
+    <p:spTree>
+      <p:nvGrpSpPr>
+        <p:cNvPr id="1" name=""/>
+        <p:cNvGrpSpPr/>
+        <p:nvPr/>
+      </p:nvGrpSpPr>
+      <p:grpSpPr/>
+      <p:sp>
+        <p:nvSpPr>
+          <p:cNvPr id="2" name="Picture Placeholder 1"/>
+          <p:cNvSpPr>
+            <a:spLocks noGrp="1"/>
+          </p:cNvSpPr>
+          <p:nvPr>
+            <p:ph type="pic" idx="10" sz="quarter"/>
+          </p:nvPr>
+        </p:nvSpPr>
+        <p:spPr/>
+        <p:txBody>
+          <a:bodyPr/>
+          <a:p>
+            <a:pPr>
+              <a:defRPr/>
+            </a:pPr>
+          </a:p>
+        </p:txBody>
+      </p:sp>
+      <p:sp>
+        <p:nvSpPr>
+          <p:cNvPr id="3" name="Text Placeholder 2"/>
+          <p:cNvSpPr>
+            <a:spLocks noGrp="1"/>
+          </p:cNvSpPr>
+          <p:nvPr>
+            <p:ph type="body" idx="2" sz="quarter"/>
+          </p:nvPr>
+        </p:nvSpPr>
+        <p:spPr/>
+        <p:txBody>
+          <a:bodyPr/>
+          <a:lstStyle/>
+          <a:p>
+            <a:pPr>
+              <a:defRPr/>
+            </a:pPr>
+            <a:r>
+              <a:t>Thị trường côn trùng có lợi đạt 877 triệu đô la (2023).</a:t>
+            </a:r>
+          </a:p>
+          <a:p>
+            <a:pPr>
+              <a:defRPr/>
+            </a:pPr>
+            <a:r>
+              <a:t>Tăng trưởng dự kiến 13.2% CAGR (2023-2028), đạt 1.63 tỷ đô la vào 2028.</a:t>
+            </a:r>
+          </a:p>
+          <a:p>
+            <a:pPr>
+              <a:defRPr/>
+            </a:pPr>
+            <a:r>
+              <a:t>Bắc Mỹ dẫn đầu thị phần côn trùng có lợi.</a:t>
+            </a:r>
+          </a:p>
+          <a:p>
+            <a:pPr>
+              <a:defRPr/>
+            </a:pPr>
+            <a:r>
+              <a:t>Ví dụ: Ong bắp cày Ganaspis kimorum được thả ở 15 bang của Hoa Kỳ để kiểm soát sinh học.</a:t>
+            </a:r>
+          </a:p>
+        </p:txBody>
+      </p:sp>
+      <p:sp>
+        <p:nvSpPr>
+          <p:cNvPr id="4" name="Text Placeholder 3"/>
+          <p:cNvSpPr>
+            <a:spLocks noGrp="1"/>
+          </p:cNvSpPr>
+          <p:nvPr>
+            <p:ph type="body" idx="15" sz="quarter"/>
+          </p:nvPr>
+        </p:nvSpPr>
+        <p:spPr/>
+        <p:txBody>
+          <a:bodyPr/>
+          <a:lstStyle/>
+          <a:p>
+            <a:pPr>
+              <a:defRPr/>
+            </a:pPr>
+            <a:r>
+              <a:t>Côn Trùng Có Lợi: Thị Trường Phát Triển</a:t>
+            </a:r>
+          </a:p>
+        </p:txBody>
+      </p:sp>
+    </p:spTree>
+  </p:cSld>
+  <p:clrMapOvr>
+    <a:masterClrMapping/>
+  </p:clrMapOvr>
+</p:sld>
+</file>
+
+<file path=ppt/slides/slide27.xml><?xml version="1.0" encoding="utf-8"?>
+<p:sld xmlns:a="http://schemas.openxmlformats.org/drawingml/2006/main" xmlns:p="http://schemas.openxmlformats.org/presentationml/2006/main" xmlns:r="http://schemas.openxmlformats.org/officeDocument/2006/relationships">
+  <p:cSld>
+    <p:spTree>
+      <p:nvGrpSpPr>
+        <p:cNvPr id="1" name=""/>
+        <p:cNvGrpSpPr/>
+        <p:nvPr/>
+      </p:nvGrpSpPr>
+      <p:grpSpPr/>
+      <p:sp>
+        <p:nvSpPr>
+          <p:cNvPr id="2" name="Picture Placeholder 1"/>
+          <p:cNvSpPr>
+            <a:spLocks noGrp="1"/>
+          </p:cNvSpPr>
+          <p:nvPr>
+            <p:ph type="pic" idx="10" sz="quarter"/>
+          </p:nvPr>
+        </p:nvSpPr>
+        <p:spPr/>
+        <p:txBody>
+          <a:bodyPr/>
+          <a:p>
+            <a:pPr>
+              <a:defRPr/>
+            </a:pPr>
+          </a:p>
+        </p:txBody>
+      </p:sp>
+      <p:sp>
+        <p:nvSpPr>
+          <p:cNvPr id="3" name="Text Placeholder 2"/>
+          <p:cNvSpPr>
+            <a:spLocks noGrp="1"/>
+          </p:cNvSpPr>
+          <p:nvPr>
+            <p:ph type="body" idx="2" sz="quarter"/>
+          </p:nvPr>
+        </p:nvSpPr>
+        <p:spPr/>
+        <p:txBody>
+          <a:bodyPr/>
+          <a:lstStyle/>
+          <a:p>
+            <a:pPr>
+              <a:defRPr/>
+            </a:pPr>
+            <a:r>
+              <a:t>Suy giảm côn trùng ảnh hưởng đến các vai trò sinh thái.</a:t>
+            </a:r>
+          </a:p>
+          <a:p>
+            <a:pPr>
+              <a:defRPr/>
+            </a:pPr>
+            <a:r>
+              <a:t>Mất cân bằng hệ sinh thái, ảnh hưởng đến chuỗi thức ăn.</a:t>
+            </a:r>
+          </a:p>
+          <a:p>
+            <a:pPr>
+              <a:defRPr/>
+            </a:pPr>
+            <a:r>
+              <a:t>Ví dụ: 75% cây lương thực có nguy cơ do suy giảm thụ phấn.</a:t>
+            </a:r>
+          </a:p>
+        </p:txBody>
+      </p:sp>
+      <p:sp>
+        <p:nvSpPr>
+          <p:cNvPr id="4" name="Text Placeholder 3"/>
+          <p:cNvSpPr>
+            <a:spLocks noGrp="1"/>
+          </p:cNvSpPr>
+          <p:nvPr>
+            <p:ph type="body" idx="15" sz="quarter"/>
+          </p:nvPr>
+        </p:nvSpPr>
+        <p:spPr/>
+        <p:txBody>
+          <a:bodyPr/>
+          <a:lstStyle/>
+          <a:p>
+            <a:pPr>
+              <a:defRPr/>
+            </a:pPr>
+            <a:r>
+              <a:t>Suy Giảm Côn Trùng: Hậu Quả Nghiêm Trọng</a:t>
+            </a:r>
+          </a:p>
+        </p:txBody>
+      </p:sp>
+    </p:spTree>
+  </p:cSld>
+  <p:clrMapOvr>
+    <a:masterClrMapping/>
+  </p:clrMapOvr>
+</p:sld>
+</file>
+
+<file path=ppt/slides/slide28.xml><?xml version="1.0" encoding="utf-8"?>
+<p:sld xmlns:a="http://schemas.openxmlformats.org/drawingml/2006/main" xmlns:p="http://schemas.openxmlformats.org/presentationml/2006/main" xmlns:r="http://schemas.openxmlformats.org/officeDocument/2006/relationships">
+  <p:cSld>
+    <p:spTree>
+      <p:nvGrpSpPr>
+        <p:cNvPr id="1" name=""/>
+        <p:cNvGrpSpPr/>
+        <p:nvPr/>
+      </p:nvGrpSpPr>
+      <p:grpSpPr/>
+      <p:sp>
+        <p:nvSpPr>
+          <p:cNvPr id="2" name="Text Placeholder 1"/>
+          <p:cNvSpPr>
+            <a:spLocks noGrp="1"/>
+          </p:cNvSpPr>
+          <p:nvPr>
+            <p:ph type="body" idx="15" sz="quarter"/>
+          </p:nvPr>
+        </p:nvSpPr>
+        <p:spPr/>
+        <p:txBody>
+          <a:bodyPr/>
+          <a:lstStyle/>
+          <a:p>
+            <a:pPr>
+              <a:defRPr/>
+            </a:pPr>
+            <a:r>
+              <a:t>Bảo tồn và Tương lai Côn trùng</a:t>
+            </a:r>
+          </a:p>
+        </p:txBody>
+      </p:sp>
+      <p:sp>
+        <p:nvSpPr>
+          <p:cNvPr id="3" name="Title 2"/>
           <p:cNvSpPr>
             <a:spLocks noGrp="1"/>
           </p:cNvSpPr>
@@ -10379,19 +11111,37 @@
               <a:defRPr/>
             </a:pPr>
             <a:r>
-              <a:t>Liên hệ và Kết nối</a:t>
-            </a:r>
-          </a:p>
-        </p:txBody>
-      </p:sp>
-      <p:sp>
-        <p:nvSpPr>
-          <p:cNvPr id="3" name="Text Placeholder 2"/>
-          <p:cNvSpPr>
-            <a:spLocks noGrp="1"/>
-          </p:cNvSpPr>
-          <p:nvPr>
-            <p:ph type="body" idx="1" sz="quarter"/>
+              <a:t>05</a:t>
+            </a:r>
+          </a:p>
+        </p:txBody>
+      </p:sp>
+    </p:spTree>
+  </p:cSld>
+  <p:clrMapOvr>
+    <a:masterClrMapping/>
+  </p:clrMapOvr>
+</p:sld>
+</file>
+
+<file path=ppt/slides/slide29.xml><?xml version="1.0" encoding="utf-8"?>
+<p:sld xmlns:a="http://schemas.openxmlformats.org/drawingml/2006/main" xmlns:p="http://schemas.openxmlformats.org/presentationml/2006/main" xmlns:r="http://schemas.openxmlformats.org/officeDocument/2006/relationships">
+  <p:cSld>
+    <p:spTree>
+      <p:nvGrpSpPr>
+        <p:cNvPr id="1" name=""/>
+        <p:cNvGrpSpPr/>
+        <p:nvPr/>
+      </p:nvGrpSpPr>
+      <p:grpSpPr/>
+      <p:sp>
+        <p:nvSpPr>
+          <p:cNvPr id="2" name="Text Placeholder 1"/>
+          <p:cNvSpPr>
+            <a:spLocks noGrp="1"/>
+          </p:cNvSpPr>
+          <p:nvPr>
+            <p:ph type="body" idx="15" sz="quarter"/>
           </p:nvPr>
         </p:nvSpPr>
         <p:spPr/>
@@ -10403,31 +11153,79 @@
               <a:defRPr/>
             </a:pPr>
             <a:r>
-              <a:t>Thông tin liên hệ:</a:t>
-            </a:r>
-          </a:p>
-          <a:p>
-            <a:pPr>
-              <a:defRPr/>
-            </a:pPr>
-            <a:r>
-              <a:t>[Tên của bạn]</a:t>
-            </a:r>
-          </a:p>
-          <a:p>
-            <a:pPr>
-              <a:defRPr/>
-            </a:pPr>
-            <a:r>
-              <a:t>[Email của bạn]</a:t>
-            </a:r>
-          </a:p>
-          <a:p>
-            <a:pPr>
-              <a:defRPr/>
-            </a:pPr>
-            <a:r>
-              <a:t>[LinkedIn (nếu có)]</a:t>
+              <a:t>Bảo tồn và Tương lai Côn trùng</a:t>
+            </a:r>
+          </a:p>
+        </p:txBody>
+      </p:sp>
+      <p:sp>
+        <p:nvSpPr>
+          <p:cNvPr id="3" name="Title 2"/>
+          <p:cNvSpPr>
+            <a:spLocks noGrp="1"/>
+          </p:cNvSpPr>
+          <p:nvPr>
+            <p:ph type="title"/>
+          </p:nvPr>
+        </p:nvSpPr>
+        <p:spPr/>
+        <p:txBody>
+          <a:bodyPr/>
+          <a:lstStyle/>
+          <a:p>
+            <a:pPr>
+              <a:defRPr/>
+            </a:pPr>
+            <a:r>
+              <a:t>Các mối đe dọa quần thể côn trùng</a:t>
+            </a:r>
+          </a:p>
+        </p:txBody>
+      </p:sp>
+      <p:sp>
+        <p:nvSpPr>
+          <p:cNvPr id="4" name="Content Placeholder 3"/>
+          <p:cNvSpPr>
+            <a:spLocks noGrp="1"/>
+          </p:cNvSpPr>
+          <p:nvPr>
+            <p:ph idx="1" sz="quarter"/>
+          </p:nvPr>
+        </p:nvSpPr>
+        <p:spPr/>
+        <p:txBody>
+          <a:bodyPr/>
+          <a:lstStyle/>
+          <a:p>
+            <a:pPr>
+              <a:defRPr/>
+            </a:pPr>
+            <a:r>
+              <a:t>Mất môi trường sống: Phá rừng, đô thị hóa, chuyển đổi đất nông nghiệp.</a:t>
+            </a:r>
+          </a:p>
+          <a:p>
+            <a:pPr>
+              <a:defRPr/>
+            </a:pPr>
+            <a:r>
+              <a:t>Sử dụng thuốc trừ sâu: Ảnh hưởng trực tiếp và gián tiếp đến côn trùng.</a:t>
+            </a:r>
+          </a:p>
+          <a:p>
+            <a:pPr>
+              <a:defRPr/>
+            </a:pPr>
+            <a:r>
+              <a:t>Biến đổi khí hậu: Thay đổi phạm vi phân bố, thời gian sinh trưởng.</a:t>
+            </a:r>
+          </a:p>
+          <a:p>
+            <a:pPr>
+              <a:defRPr/>
+            </a:pPr>
+            <a:r>
+              <a:t>Loài xâm lấn: Cạnh tranh, ký sinh, gây bệnh cho côn trùng bản địa.</a:t>
             </a:r>
           </a:p>
         </p:txBody>
@@ -10469,7 +11267,7 @@
               <a:defRPr/>
             </a:pPr>
             <a:r>
-              <a:t>Giới thiệu về Reinforcement Learning</a:t>
+              <a:t>Giới Thiệu: Sự Đa Dạng Côn Trùng</a:t>
             </a:r>
           </a:p>
         </p:txBody>
@@ -10494,6 +11292,1170 @@
             </a:pPr>
             <a:r>
               <a:t>01</a:t>
+            </a:r>
+          </a:p>
+        </p:txBody>
+      </p:sp>
+    </p:spTree>
+  </p:cSld>
+  <p:clrMapOvr>
+    <a:masterClrMapping/>
+  </p:clrMapOvr>
+</p:sld>
+</file>
+
+<file path=ppt/slides/slide30.xml><?xml version="1.0" encoding="utf-8"?>
+<p:sld xmlns:a="http://schemas.openxmlformats.org/drawingml/2006/main" xmlns:p="http://schemas.openxmlformats.org/presentationml/2006/main" xmlns:r="http://schemas.openxmlformats.org/officeDocument/2006/relationships">
+  <p:cSld>
+    <p:spTree>
+      <p:nvGrpSpPr>
+        <p:cNvPr id="1" name=""/>
+        <p:cNvGrpSpPr/>
+        <p:nvPr/>
+      </p:nvGrpSpPr>
+      <p:grpSpPr/>
+      <p:sp>
+        <p:nvSpPr>
+          <p:cNvPr id="2" name="Text Placeholder 1"/>
+          <p:cNvSpPr>
+            <a:spLocks noGrp="1"/>
+          </p:cNvSpPr>
+          <p:nvPr>
+            <p:ph type="body" idx="15" sz="quarter"/>
+          </p:nvPr>
+        </p:nvSpPr>
+        <p:spPr/>
+        <p:txBody>
+          <a:bodyPr/>
+          <a:lstStyle/>
+          <a:p>
+            <a:pPr>
+              <a:defRPr/>
+            </a:pPr>
+            <a:r>
+              <a:t>Bảo tồn và Tương lai Côn trùng</a:t>
+            </a:r>
+          </a:p>
+        </p:txBody>
+      </p:sp>
+      <p:sp>
+        <p:nvSpPr>
+          <p:cNvPr id="3" name="Title 2"/>
+          <p:cNvSpPr>
+            <a:spLocks noGrp="1"/>
+          </p:cNvSpPr>
+          <p:nvPr>
+            <p:ph type="title"/>
+          </p:nvPr>
+        </p:nvSpPr>
+        <p:spPr/>
+        <p:txBody>
+          <a:bodyPr/>
+          <a:lstStyle/>
+          <a:p>
+            <a:pPr>
+              <a:defRPr/>
+            </a:pPr>
+            <a:r>
+              <a:t>Hậu quả của sự suy giảm côn trùng</a:t>
+            </a:r>
+          </a:p>
+        </p:txBody>
+      </p:sp>
+      <p:sp>
+        <p:nvSpPr>
+          <p:cNvPr id="4" name="Content Placeholder 3"/>
+          <p:cNvSpPr>
+            <a:spLocks noGrp="1"/>
+          </p:cNvSpPr>
+          <p:nvPr>
+            <p:ph idx="1" sz="half"/>
+          </p:nvPr>
+        </p:nvSpPr>
+        <p:spPr/>
+        <p:txBody>
+          <a:bodyPr/>
+          <a:lstStyle/>
+          <a:p>
+            <a:pPr>
+              <a:defRPr/>
+            </a:pPr>
+            <a:r>
+              <a:t>Ảnh hưởng đến thụ phấn: 75% cây trồng lương thực có nguy cơ do suy giảm thụ phấn.</a:t>
+            </a:r>
+          </a:p>
+        </p:txBody>
+      </p:sp>
+      <p:sp>
+        <p:nvSpPr>
+          <p:cNvPr id="5" name="Content Placeholder 4"/>
+          <p:cNvSpPr>
+            <a:spLocks noGrp="1"/>
+          </p:cNvSpPr>
+          <p:nvPr>
+            <p:ph idx="2" sz="half"/>
+          </p:nvPr>
+        </p:nvSpPr>
+        <p:spPr/>
+        <p:txBody>
+          <a:bodyPr/>
+          <a:lstStyle/>
+          <a:p>
+            <a:pPr>
+              <a:defRPr/>
+            </a:pPr>
+            <a:r>
+              <a:t>Mất cân bằng chuỗi thức ăn: Côn trùng là nguồn thức ăn quan trọng cho nhiều loài động vật.</a:t>
+            </a:r>
+          </a:p>
+        </p:txBody>
+      </p:sp>
+      <p:sp>
+        <p:nvSpPr>
+          <p:cNvPr id="6" name="Content Placeholder 5"/>
+          <p:cNvSpPr>
+            <a:spLocks noGrp="1"/>
+          </p:cNvSpPr>
+          <p:nvPr>
+            <p:ph idx="3" sz="half"/>
+          </p:nvPr>
+        </p:nvSpPr>
+        <p:spPr/>
+        <p:txBody>
+          <a:bodyPr/>
+          <a:lstStyle/>
+          <a:p>
+            <a:pPr>
+              <a:defRPr/>
+            </a:pPr>
+            <a:r>
+              <a:t>Giảm các dịch vụ hệ sinh thái: Phân hủy chất hữu cơ, kiểm soát dịch hại tự nhiên.</a:t>
+            </a:r>
+          </a:p>
+        </p:txBody>
+      </p:sp>
+      <p:sp>
+        <p:nvSpPr>
+          <p:cNvPr id="7" name="Content Placeholder 6"/>
+          <p:cNvSpPr>
+            <a:spLocks noGrp="1"/>
+          </p:cNvSpPr>
+          <p:nvPr>
+            <p:ph idx="4" sz="half"/>
+          </p:nvPr>
+        </p:nvSpPr>
+        <p:spPr/>
+        <p:txBody>
+          <a:bodyPr/>
+          <a:lstStyle/>
+          <a:p>
+            <a:pPr>
+              <a:defRPr/>
+            </a:pPr>
+            <a:r>
+              <a:t>Ảnh hưởng kinh tế: Giảm năng suất cây trồng, tăng chi phí kiểm soát dịch hại.</a:t>
+            </a:r>
+          </a:p>
+        </p:txBody>
+      </p:sp>
+    </p:spTree>
+  </p:cSld>
+  <p:clrMapOvr>
+    <a:masterClrMapping/>
+  </p:clrMapOvr>
+</p:sld>
+</file>
+
+<file path=ppt/slides/slide31.xml><?xml version="1.0" encoding="utf-8"?>
+<p:sld xmlns:a="http://schemas.openxmlformats.org/drawingml/2006/main" xmlns:p="http://schemas.openxmlformats.org/presentationml/2006/main" xmlns:r="http://schemas.openxmlformats.org/officeDocument/2006/relationships">
+  <p:cSld>
+    <p:spTree>
+      <p:nvGrpSpPr>
+        <p:cNvPr id="1" name=""/>
+        <p:cNvGrpSpPr/>
+        <p:nvPr/>
+      </p:nvGrpSpPr>
+      <p:grpSpPr/>
+      <p:sp>
+        <p:nvSpPr>
+          <p:cNvPr id="2" name="Text Placeholder 1"/>
+          <p:cNvSpPr>
+            <a:spLocks noGrp="1"/>
+          </p:cNvSpPr>
+          <p:nvPr>
+            <p:ph type="body" idx="15" sz="quarter"/>
+          </p:nvPr>
+        </p:nvSpPr>
+        <p:spPr/>
+        <p:txBody>
+          <a:bodyPr/>
+          <a:lstStyle/>
+          <a:p>
+            <a:pPr>
+              <a:defRPr/>
+            </a:pPr>
+            <a:r>
+              <a:t>Bảo tồn và Tương lai Côn trùng</a:t>
+            </a:r>
+          </a:p>
+        </p:txBody>
+      </p:sp>
+      <p:sp>
+        <p:nvSpPr>
+          <p:cNvPr id="3" name="Title 2"/>
+          <p:cNvSpPr>
+            <a:spLocks noGrp="1"/>
+          </p:cNvSpPr>
+          <p:nvPr>
+            <p:ph type="title"/>
+          </p:nvPr>
+        </p:nvSpPr>
+        <p:spPr/>
+        <p:txBody>
+          <a:bodyPr/>
+          <a:lstStyle/>
+          <a:p>
+            <a:pPr>
+              <a:defRPr/>
+            </a:pPr>
+            <a:r>
+              <a:t>Chiến lược bảo tồn côn trùng</a:t>
+            </a:r>
+          </a:p>
+        </p:txBody>
+      </p:sp>
+      <p:sp>
+        <p:nvSpPr>
+          <p:cNvPr id="4" name="Content Placeholder 3"/>
+          <p:cNvSpPr>
+            <a:spLocks noGrp="1"/>
+          </p:cNvSpPr>
+          <p:nvPr>
+            <p:ph idx="1" sz="half"/>
+          </p:nvPr>
+        </p:nvSpPr>
+        <p:spPr/>
+        <p:txBody>
+          <a:bodyPr/>
+          <a:lstStyle/>
+          <a:p>
+            <a:pPr>
+              <a:defRPr/>
+            </a:pPr>
+            <a:r>
+              <a:t>Phục hồi môi trường sống: Tạo ra và duy trì các khu vực sống tự nhiên cho côn trùng.</a:t>
+            </a:r>
+          </a:p>
+        </p:txBody>
+      </p:sp>
+      <p:sp>
+        <p:nvSpPr>
+          <p:cNvPr id="5" name="Content Placeholder 4"/>
+          <p:cNvSpPr>
+            <a:spLocks noGrp="1"/>
+          </p:cNvSpPr>
+          <p:nvPr>
+            <p:ph idx="3" sz="half"/>
+          </p:nvPr>
+        </p:nvSpPr>
+        <p:spPr/>
+        <p:txBody>
+          <a:bodyPr/>
+          <a:lstStyle/>
+          <a:p>
+            <a:pPr>
+              <a:defRPr/>
+            </a:pPr>
+            <a:r>
+              <a:t>Giảm sử dụng thuốc trừ sâu: Áp dụng các phương pháp kiểm soát dịch hại tổng hợp (IPM).</a:t>
+            </a:r>
+          </a:p>
+        </p:txBody>
+      </p:sp>
+      <p:sp>
+        <p:nvSpPr>
+          <p:cNvPr id="6" name="Content Placeholder 5"/>
+          <p:cNvSpPr>
+            <a:spLocks noGrp="1"/>
+          </p:cNvSpPr>
+          <p:nvPr>
+            <p:ph idx="2" sz="half"/>
+          </p:nvPr>
+        </p:nvSpPr>
+        <p:spPr/>
+        <p:txBody>
+          <a:bodyPr/>
+          <a:lstStyle/>
+          <a:p>
+            <a:pPr>
+              <a:defRPr/>
+            </a:pPr>
+            <a:r>
+              <a:t>Thúc đẩy các biện pháp thân thiện với côn trùng thụ phấn: Trồng cây bản địa, tạo môi trường sống cho côn trùng thụ phấn.</a:t>
+            </a:r>
+          </a:p>
+        </p:txBody>
+      </p:sp>
+      <p:sp>
+        <p:nvSpPr>
+          <p:cNvPr id="7" name="Content Placeholder 6"/>
+          <p:cNvSpPr>
+            <a:spLocks noGrp="1"/>
+          </p:cNvSpPr>
+          <p:nvPr>
+            <p:ph idx="4" sz="half"/>
+          </p:nvPr>
+        </p:nvSpPr>
+        <p:spPr/>
+        <p:txBody>
+          <a:bodyPr/>
+          <a:lstStyle/>
+          <a:p>
+            <a:pPr>
+              <a:defRPr/>
+            </a:pPr>
+            <a:r>
+              <a:t>Quản lý bền vững đất nông nghiệp: Giảm thiểu tác động tiêu cực đến côn trùng.</a:t>
+            </a:r>
+          </a:p>
+        </p:txBody>
+      </p:sp>
+    </p:spTree>
+  </p:cSld>
+  <p:clrMapOvr>
+    <a:masterClrMapping/>
+  </p:clrMapOvr>
+</p:sld>
+</file>
+
+<file path=ppt/slides/slide32.xml><?xml version="1.0" encoding="utf-8"?>
+<p:sld xmlns:a="http://schemas.openxmlformats.org/drawingml/2006/main" xmlns:p="http://schemas.openxmlformats.org/presentationml/2006/main" xmlns:r="http://schemas.openxmlformats.org/officeDocument/2006/relationships">
+  <p:cSld>
+    <p:spTree>
+      <p:nvGrpSpPr>
+        <p:cNvPr id="1" name=""/>
+        <p:cNvGrpSpPr/>
+        <p:nvPr/>
+      </p:nvGrpSpPr>
+      <p:grpSpPr/>
+      <p:sp>
+        <p:nvSpPr>
+          <p:cNvPr id="2" name="Text Placeholder 1"/>
+          <p:cNvSpPr>
+            <a:spLocks noGrp="1"/>
+          </p:cNvSpPr>
+          <p:nvPr>
+            <p:ph type="body" idx="15" sz="quarter"/>
+          </p:nvPr>
+        </p:nvSpPr>
+        <p:spPr/>
+        <p:txBody>
+          <a:bodyPr/>
+          <a:lstStyle/>
+          <a:p>
+            <a:pPr>
+              <a:defRPr/>
+            </a:pPr>
+            <a:r>
+              <a:t>Bảo tồn và Tương lai Côn trùng</a:t>
+            </a:r>
+          </a:p>
+        </p:txBody>
+      </p:sp>
+      <p:sp>
+        <p:nvSpPr>
+          <p:cNvPr id="3" name="Title 2"/>
+          <p:cNvSpPr>
+            <a:spLocks noGrp="1"/>
+          </p:cNvSpPr>
+          <p:nvPr>
+            <p:ph type="title"/>
+          </p:nvPr>
+        </p:nvSpPr>
+        <p:spPr/>
+        <p:txBody>
+          <a:bodyPr/>
+          <a:lstStyle/>
+          <a:p>
+            <a:pPr>
+              <a:defRPr/>
+            </a:pPr>
+            <a:r>
+              <a:t>Khoa học công dân: Đóng góp bảo tồn</a:t>
+            </a:r>
+          </a:p>
+        </p:txBody>
+      </p:sp>
+      <p:sp>
+        <p:nvSpPr>
+          <p:cNvPr id="4" name="Content Placeholder 3"/>
+          <p:cNvSpPr>
+            <a:spLocks noGrp="1"/>
+          </p:cNvSpPr>
+          <p:nvPr>
+            <p:ph idx="1" sz="quarter"/>
+          </p:nvPr>
+        </p:nvSpPr>
+        <p:spPr/>
+        <p:txBody>
+          <a:bodyPr/>
+          <a:lstStyle/>
+          <a:p>
+            <a:pPr>
+              <a:defRPr/>
+            </a:pPr>
+            <a:r>
+              <a:t>Theo nghiên cứu, tình nguyện viên thu thập khoảng 25% dữ liệu về các loài côn trùng trên toàn cầu, và lên đến 80% ở Châu Âu.</a:t>
+            </a:r>
+          </a:p>
+          <a:p>
+            <a:pPr>
+              <a:defRPr/>
+            </a:pPr>
+            <a:r>
+              <a:t>Quan sát và ghi lại dữ liệu về côn trùng: Sử dụng các ứng dụng và nền tảng trực tuyến để chia sẻ thông tin.</a:t>
+            </a:r>
+          </a:p>
+          <a:p>
+            <a:pPr>
+              <a:defRPr/>
+            </a:pPr>
+            <a:r>
+              <a:t>Tham gia các dự án nghiên cứu: Hỗ trợ các nhà khoa học thu thập dữ liệu và phân tích mẫu.</a:t>
+            </a:r>
+          </a:p>
+          <a:p>
+            <a:pPr>
+              <a:defRPr/>
+            </a:pPr>
+            <a:r>
+              <a:t>Nâng cao nhận thức cộng đồng: Chia sẻ thông tin về tầm quan trọng của côn trùng và các mối đe dọa đối với chúng.</a:t>
+            </a:r>
+          </a:p>
+        </p:txBody>
+      </p:sp>
+    </p:spTree>
+  </p:cSld>
+  <p:clrMapOvr>
+    <a:masterClrMapping/>
+  </p:clrMapOvr>
+</p:sld>
+</file>
+
+<file path=ppt/slides/slide33.xml><?xml version="1.0" encoding="utf-8"?>
+<p:sld xmlns:a="http://schemas.openxmlformats.org/drawingml/2006/main" xmlns:p="http://schemas.openxmlformats.org/presentationml/2006/main" xmlns:r="http://schemas.openxmlformats.org/officeDocument/2006/relationships">
+  <p:cSld>
+    <p:spTree>
+      <p:nvGrpSpPr>
+        <p:cNvPr id="1" name=""/>
+        <p:cNvGrpSpPr/>
+        <p:nvPr/>
+      </p:nvGrpSpPr>
+      <p:grpSpPr/>
+      <p:sp>
+        <p:nvSpPr>
+          <p:cNvPr id="2" name="Text Placeholder 1"/>
+          <p:cNvSpPr>
+            <a:spLocks noGrp="1"/>
+          </p:cNvSpPr>
+          <p:nvPr>
+            <p:ph type="body" idx="15" sz="quarter"/>
+          </p:nvPr>
+        </p:nvSpPr>
+        <p:spPr/>
+        <p:txBody>
+          <a:bodyPr/>
+          <a:lstStyle/>
+          <a:p>
+            <a:pPr>
+              <a:defRPr/>
+            </a:pPr>
+            <a:r>
+              <a:t>Bảo tồn và Tương lai Côn trùng</a:t>
+            </a:r>
+          </a:p>
+        </p:txBody>
+      </p:sp>
+      <p:sp>
+        <p:nvSpPr>
+          <p:cNvPr id="3" name="Title 2"/>
+          <p:cNvSpPr>
+            <a:spLocks noGrp="1"/>
+          </p:cNvSpPr>
+          <p:nvPr>
+            <p:ph type="title"/>
+          </p:nvPr>
+        </p:nvSpPr>
+        <p:spPr/>
+        <p:txBody>
+          <a:bodyPr/>
+          <a:lstStyle/>
+          <a:p>
+            <a:pPr>
+              <a:defRPr/>
+            </a:pPr>
+            <a:r>
+              <a:t>Thị trường côn trùng có lợi</a:t>
+            </a:r>
+          </a:p>
+        </p:txBody>
+      </p:sp>
+      <p:sp>
+        <p:nvSpPr>
+          <p:cNvPr id="4" name="Content Placeholder 3"/>
+          <p:cNvSpPr>
+            <a:spLocks noGrp="1"/>
+          </p:cNvSpPr>
+          <p:nvPr>
+            <p:ph idx="1" sz="quarter"/>
+          </p:nvPr>
+        </p:nvSpPr>
+        <p:spPr/>
+        <p:txBody>
+          <a:bodyPr/>
+          <a:lstStyle/>
+          <a:p>
+            <a:pPr>
+              <a:defRPr/>
+            </a:pPr>
+            <a:r>
+              <a:t>Thị trường côn trùng có lợi đạt 877 triệu đô la vào năm 2023.</a:t>
+            </a:r>
+          </a:p>
+          <a:p>
+            <a:pPr>
+              <a:defRPr/>
+            </a:pPr>
+            <a:r>
+              <a:t>Tăng trưởng dự kiến: 13.2% CAGR (2023-2028), dự kiến đạt 1.63 tỷ đô la vào năm 2028.</a:t>
+            </a:r>
+          </a:p>
+          <a:p>
+            <a:pPr>
+              <a:defRPr/>
+            </a:pPr>
+            <a:r>
+              <a:t>Bắc Mỹ dẫn đầu thị phần thị trường côn trùng có lợi.</a:t>
+            </a:r>
+          </a:p>
+        </p:txBody>
+      </p:sp>
+    </p:spTree>
+  </p:cSld>
+  <p:clrMapOvr>
+    <a:masterClrMapping/>
+  </p:clrMapOvr>
+</p:sld>
+</file>
+
+<file path=ppt/slides/slide34.xml><?xml version="1.0" encoding="utf-8"?>
+<p:sld xmlns:a="http://schemas.openxmlformats.org/drawingml/2006/main" xmlns:p="http://schemas.openxmlformats.org/presentationml/2006/main" xmlns:r="http://schemas.openxmlformats.org/officeDocument/2006/relationships">
+  <p:cSld>
+    <p:spTree>
+      <p:nvGrpSpPr>
+        <p:cNvPr id="1" name=""/>
+        <p:cNvGrpSpPr/>
+        <p:nvPr/>
+      </p:nvGrpSpPr>
+      <p:grpSpPr/>
+      <p:sp>
+        <p:nvSpPr>
+          <p:cNvPr id="2" name="Text Placeholder 1"/>
+          <p:cNvSpPr>
+            <a:spLocks noGrp="1"/>
+          </p:cNvSpPr>
+          <p:nvPr>
+            <p:ph type="body" idx="15" sz="quarter"/>
+          </p:nvPr>
+        </p:nvSpPr>
+        <p:spPr/>
+        <p:txBody>
+          <a:bodyPr/>
+          <a:lstStyle/>
+          <a:p>
+            <a:pPr>
+              <a:defRPr/>
+            </a:pPr>
+            <a:r>
+              <a:t>Bảo tồn và Tương lai Côn trùng</a:t>
+            </a:r>
+          </a:p>
+        </p:txBody>
+      </p:sp>
+      <p:sp>
+        <p:nvSpPr>
+          <p:cNvPr id="3" name="Title 2"/>
+          <p:cNvSpPr>
+            <a:spLocks noGrp="1"/>
+          </p:cNvSpPr>
+          <p:nvPr>
+            <p:ph type="title"/>
+          </p:nvPr>
+        </p:nvSpPr>
+        <p:spPr/>
+        <p:txBody>
+          <a:bodyPr/>
+          <a:lstStyle/>
+          <a:p>
+            <a:pPr>
+              <a:defRPr/>
+            </a:pPr>
+            <a:r>
+              <a:t>Giám sát côn trùng toàn cầu</a:t>
+            </a:r>
+          </a:p>
+        </p:txBody>
+      </p:sp>
+      <p:sp>
+        <p:nvSpPr>
+          <p:cNvPr id="4" name="Content Placeholder 3"/>
+          <p:cNvSpPr>
+            <a:spLocks noGrp="1"/>
+          </p:cNvSpPr>
+          <p:nvPr>
+            <p:ph idx="1" sz="half"/>
+          </p:nvPr>
+        </p:nvSpPr>
+        <p:spPr/>
+        <p:txBody>
+          <a:bodyPr/>
+          <a:lstStyle/>
+          <a:p>
+            <a:pPr>
+              <a:defRPr/>
+            </a:pPr>
+            <a:r>
+              <a:t>Pháp: 16,349 địa điểm lấy mẫu từ năm 2006.</a:t>
+            </a:r>
+          </a:p>
+        </p:txBody>
+      </p:sp>
+      <p:sp>
+        <p:nvSpPr>
+          <p:cNvPr id="5" name="Content Placeholder 4"/>
+          <p:cNvSpPr>
+            <a:spLocks noGrp="1"/>
+          </p:cNvSpPr>
+          <p:nvPr>
+            <p:ph idx="3" sz="half"/>
+          </p:nvPr>
+        </p:nvSpPr>
+        <p:spPr/>
+        <p:txBody>
+          <a:bodyPr/>
+          <a:lstStyle/>
+          <a:p>
+            <a:pPr>
+              <a:defRPr/>
+            </a:pPr>
+            <a:r>
+              <a:t>Hà Lan: 80-100 camera được triển khai hàng năm từ năm 2019.</a:t>
+            </a:r>
+          </a:p>
+        </p:txBody>
+      </p:sp>
+      <p:sp>
+        <p:nvSpPr>
+          <p:cNvPr id="6" name="Content Placeholder 5"/>
+          <p:cNvSpPr>
+            <a:spLocks noGrp="1"/>
+          </p:cNvSpPr>
+          <p:nvPr>
+            <p:ph idx="2" sz="half"/>
+          </p:nvPr>
+        </p:nvSpPr>
+        <p:spPr/>
+        <p:txBody>
+          <a:bodyPr/>
+          <a:lstStyle/>
+          <a:p>
+            <a:pPr>
+              <a:defRPr/>
+            </a:pPr>
+            <a:r>
+              <a:t>Úc: Mạng lưới cảm biến âm thanh ghi lại âm thanh động vật hoang dã trên khắp nước Úc (dự án 5 năm).</a:t>
+            </a:r>
+          </a:p>
+        </p:txBody>
+      </p:sp>
+      <p:sp>
+        <p:nvSpPr>
+          <p:cNvPr id="7" name="Content Placeholder 6"/>
+          <p:cNvSpPr>
+            <a:spLocks noGrp="1"/>
+          </p:cNvSpPr>
+          <p:nvPr>
+            <p:ph idx="4" sz="half"/>
+          </p:nvPr>
+        </p:nvSpPr>
+        <p:spPr/>
+        <p:txBody>
+          <a:bodyPr/>
+          <a:lstStyle/>
+          <a:p>
+            <a:pPr>
+              <a:defRPr/>
+            </a:pPr>
+            <a:r>
+              <a:t>Đức: AMMOD đã được thử nghiệm tại ba địa điểm từ năm 2020.</a:t>
+            </a:r>
+          </a:p>
+        </p:txBody>
+      </p:sp>
+    </p:spTree>
+  </p:cSld>
+  <p:clrMapOvr>
+    <a:masterClrMapping/>
+  </p:clrMapOvr>
+</p:sld>
+</file>
+
+<file path=ppt/slides/slide35.xml><?xml version="1.0" encoding="utf-8"?>
+<p:sld xmlns:a="http://schemas.openxmlformats.org/drawingml/2006/main" xmlns:p="http://schemas.openxmlformats.org/presentationml/2006/main" xmlns:r="http://schemas.openxmlformats.org/officeDocument/2006/relationships">
+  <p:cSld>
+    <p:spTree>
+      <p:nvGrpSpPr>
+        <p:cNvPr id="1" name=""/>
+        <p:cNvGrpSpPr/>
+        <p:nvPr/>
+      </p:nvGrpSpPr>
+      <p:grpSpPr/>
+      <p:sp>
+        <p:nvSpPr>
+          <p:cNvPr id="2" name="Title 1"/>
+          <p:cNvSpPr>
+            <a:spLocks noGrp="1"/>
+          </p:cNvSpPr>
+          <p:nvPr>
+            <p:ph type="ctrTitle"/>
+          </p:nvPr>
+        </p:nvSpPr>
+        <p:spPr/>
+        <p:txBody>
+          <a:bodyPr/>
+          <a:lstStyle/>
+          <a:p>
+            <a:pPr>
+              <a:defRPr/>
+            </a:pPr>
+            <a:r>
+              <a:t>Tóm Tắt: Tầm Quan Trọng Của Côn Trùng</a:t>
+            </a:r>
+          </a:p>
+        </p:txBody>
+      </p:sp>
+      <p:sp>
+        <p:nvSpPr>
+          <p:cNvPr id="3" name="Text Placeholder 2"/>
+          <p:cNvSpPr>
+            <a:spLocks noGrp="1"/>
+          </p:cNvSpPr>
+          <p:nvPr>
+            <p:ph type="body" idx="1" sz="quarter"/>
+          </p:nvPr>
+        </p:nvSpPr>
+        <p:spPr/>
+        <p:txBody>
+          <a:bodyPr/>
+          <a:lstStyle/>
+          <a:p>
+            <a:pPr>
+              <a:defRPr/>
+            </a:pPr>
+            <a:r>
+              <a:t>Đa dạng sinh học côn trùng: 80% loài chưa được mô tả.</a:t>
+            </a:r>
+          </a:p>
+          <a:p>
+            <a:pPr>
+              <a:defRPr/>
+            </a:pPr>
+            <a:r>
+              <a:t>Vai trò sinh thái: Thụ phấn, phân hủy, kiểm soát dịch hại.</a:t>
+            </a:r>
+          </a:p>
+          <a:p>
+            <a:pPr>
+              <a:defRPr/>
+            </a:pPr>
+            <a:r>
+              <a:t>Giá trị kinh tế: Thị trường côn trùng có lợi đạt 877 triệu đô la (2023).</a:t>
+            </a:r>
+          </a:p>
+          <a:p>
+            <a:pPr>
+              <a:defRPr/>
+            </a:pPr>
+            <a:r>
+              <a:t>Mối liên kết hệ sinh thái: Côn trùng là mắt xích quan trọng.</a:t>
+            </a:r>
+          </a:p>
+        </p:txBody>
+      </p:sp>
+    </p:spTree>
+  </p:cSld>
+  <p:clrMapOvr>
+    <a:masterClrMapping/>
+  </p:clrMapOvr>
+</p:sld>
+</file>
+
+<file path=ppt/slides/slide36.xml><?xml version="1.0" encoding="utf-8"?>
+<p:sld xmlns:a="http://schemas.openxmlformats.org/drawingml/2006/main" xmlns:p="http://schemas.openxmlformats.org/presentationml/2006/main" xmlns:r="http://schemas.openxmlformats.org/officeDocument/2006/relationships">
+  <p:cSld>
+    <p:spTree>
+      <p:nvGrpSpPr>
+        <p:cNvPr id="1" name=""/>
+        <p:cNvGrpSpPr/>
+        <p:nvPr/>
+      </p:nvGrpSpPr>
+      <p:grpSpPr/>
+      <p:sp>
+        <p:nvSpPr>
+          <p:cNvPr id="2" name="Title 1"/>
+          <p:cNvSpPr>
+            <a:spLocks noGrp="1"/>
+          </p:cNvSpPr>
+          <p:nvPr>
+            <p:ph type="ctrTitle"/>
+          </p:nvPr>
+        </p:nvSpPr>
+        <p:spPr/>
+        <p:txBody>
+          <a:bodyPr/>
+          <a:lstStyle/>
+          <a:p>
+            <a:pPr>
+              <a:defRPr/>
+            </a:pPr>
+            <a:r>
+              <a:t>Hành Động: Bảo Vệ Côn Trùng</a:t>
+            </a:r>
+          </a:p>
+        </p:txBody>
+      </p:sp>
+      <p:sp>
+        <p:nvSpPr>
+          <p:cNvPr id="3" name="Text Placeholder 2"/>
+          <p:cNvSpPr>
+            <a:spLocks noGrp="1"/>
+          </p:cNvSpPr>
+          <p:nvPr>
+            <p:ph type="body" idx="1" sz="quarter"/>
+          </p:nvPr>
+        </p:nvSpPr>
+        <p:spPr/>
+        <p:txBody>
+          <a:bodyPr/>
+          <a:lstStyle/>
+          <a:p>
+            <a:pPr>
+              <a:defRPr/>
+            </a:pPr>
+            <a:r>
+              <a:t>Tìm hiểu thêm: Nghiên cứu về côn trùng và hệ sinh thái.</a:t>
+            </a:r>
+          </a:p>
+          <a:p>
+            <a:pPr>
+              <a:defRPr/>
+            </a:pPr>
+            <a:r>
+              <a:t>Hỗ trợ bảo tồn: Tham gia các dự án bảo tồn côn trùng.</a:t>
+            </a:r>
+          </a:p>
+          <a:p>
+            <a:pPr>
+              <a:defRPr/>
+            </a:pPr>
+            <a:r>
+              <a:t>Giảm sử dụng thuốc trừ sâu: Ưu tiên các phương pháp IPM (Integrated Pest Management).</a:t>
+            </a:r>
+          </a:p>
+          <a:p>
+            <a:pPr>
+              <a:defRPr/>
+            </a:pPr>
+            <a:r>
+              <a:t>Bảo vệ môi trường sống: Tạo môi trường sống thân thiện với côn trùng.</a:t>
+            </a:r>
+          </a:p>
+          <a:p>
+            <a:pPr>
+              <a:defRPr/>
+            </a:pPr>
+            <a:r>
+              <a:t>Hành động nhỏ, thay đổi lớn: Mỗi hành động đều có giá trị.</a:t>
+            </a:r>
+          </a:p>
+        </p:txBody>
+      </p:sp>
+    </p:spTree>
+  </p:cSld>
+  <p:clrMapOvr>
+    <a:masterClrMapping/>
+  </p:clrMapOvr>
+</p:sld>
+</file>
+
+<file path=ppt/slides/slide37.xml><?xml version="1.0" encoding="utf-8"?>
+<p:sld xmlns:a="http://schemas.openxmlformats.org/drawingml/2006/main" xmlns:p="http://schemas.openxmlformats.org/presentationml/2006/main" xmlns:r="http://schemas.openxmlformats.org/officeDocument/2006/relationships">
+  <p:cSld>
+    <p:spTree>
+      <p:nvGrpSpPr>
+        <p:cNvPr id="1" name=""/>
+        <p:cNvGrpSpPr/>
+        <p:nvPr/>
+      </p:nvGrpSpPr>
+      <p:grpSpPr/>
+      <p:sp>
+        <p:nvSpPr>
+          <p:cNvPr id="2" name="Title 1"/>
+          <p:cNvSpPr>
+            <a:spLocks noGrp="1"/>
+          </p:cNvSpPr>
+          <p:nvPr>
+            <p:ph type="ctrTitle"/>
+          </p:nvPr>
+        </p:nvSpPr>
+        <p:spPr/>
+        <p:txBody>
+          <a:bodyPr/>
+          <a:lstStyle/>
+          <a:p>
+            <a:pPr>
+              <a:defRPr/>
+            </a:pPr>
+            <a:r>
+              <a:t>Thế Giới Không Côn Trùng: Hậu Quả</a:t>
+            </a:r>
+          </a:p>
+        </p:txBody>
+      </p:sp>
+      <p:sp>
+        <p:nvSpPr>
+          <p:cNvPr id="3" name="Text Placeholder 2"/>
+          <p:cNvSpPr>
+            <a:spLocks noGrp="1"/>
+          </p:cNvSpPr>
+          <p:nvPr>
+            <p:ph type="body" idx="1" sz="quarter"/>
+          </p:nvPr>
+        </p:nvSpPr>
+        <p:spPr/>
+        <p:txBody>
+          <a:bodyPr/>
+          <a:lstStyle/>
+          <a:p>
+            <a:pPr>
+              <a:defRPr/>
+            </a:pPr>
+            <a:r>
+              <a:t>Sự sụp đổ tiềm tàng của hệ sinh thái do thiếu thụ phấn và phân hủy.</a:t>
+            </a:r>
+          </a:p>
+          <a:p>
+            <a:pPr>
+              <a:defRPr/>
+            </a:pPr>
+            <a:r>
+              <a:t>Hơn 75% cây lương thực có nguy cơ do suy giảm thụ phấn.</a:t>
+            </a:r>
+          </a:p>
+          <a:p>
+            <a:pPr>
+              <a:defRPr/>
+            </a:pPr>
+            <a:r>
+              <a:t>Mất cân bằng chuỗi thức ăn: Ảnh hưởng đến chim, động vật có vú và các loài khác.</a:t>
+            </a:r>
+          </a:p>
+          <a:p>
+            <a:pPr>
+              <a:defRPr/>
+            </a:pPr>
+            <a:r>
+              <a:t>Mất đa dạng sinh học: Nhiều loài thực vật và động vật phụ thuộc vào côn trùng sẽ biến mất.</a:t>
+            </a:r>
+          </a:p>
+        </p:txBody>
+      </p:sp>
+    </p:spTree>
+  </p:cSld>
+  <p:clrMapOvr>
+    <a:masterClrMapping/>
+  </p:clrMapOvr>
+</p:sld>
+</file>
+
+<file path=ppt/slides/slide38.xml><?xml version="1.0" encoding="utf-8"?>
+<p:sld xmlns:a="http://schemas.openxmlformats.org/drawingml/2006/main" xmlns:p="http://schemas.openxmlformats.org/presentationml/2006/main" xmlns:r="http://schemas.openxmlformats.org/officeDocument/2006/relationships">
+  <p:cSld>
+    <p:spTree>
+      <p:nvGrpSpPr>
+        <p:cNvPr id="1" name=""/>
+        <p:cNvGrpSpPr/>
+        <p:nvPr/>
+      </p:nvGrpSpPr>
+      <p:grpSpPr/>
+      <p:sp>
+        <p:nvSpPr>
+          <p:cNvPr id="2" name="Title 1"/>
+          <p:cNvSpPr>
+            <a:spLocks noGrp="1"/>
+          </p:cNvSpPr>
+          <p:nvPr>
+            <p:ph type="ctrTitle"/>
+          </p:nvPr>
+        </p:nvSpPr>
+        <p:spPr/>
+        <p:txBody>
+          <a:bodyPr/>
+          <a:lstStyle/>
+          <a:p>
+            <a:pPr>
+              <a:defRPr/>
+            </a:pPr>
+            <a:r>
+              <a:t>Bảo Tồn Côn Trùng: Vì Một Tương Lai</a:t>
+            </a:r>
+          </a:p>
+        </p:txBody>
+      </p:sp>
+      <p:sp>
+        <p:nvSpPr>
+          <p:cNvPr id="3" name="Text Placeholder 2"/>
+          <p:cNvSpPr>
+            <a:spLocks noGrp="1"/>
+          </p:cNvSpPr>
+          <p:nvPr>
+            <p:ph type="body" idx="1" sz="quarter"/>
+          </p:nvPr>
+        </p:nvSpPr>
+        <p:spPr/>
+        <p:txBody>
+          <a:bodyPr/>
+          <a:lstStyle/>
+          <a:p>
+            <a:pPr>
+              <a:defRPr/>
+            </a:pPr>
+            <a:r>
+              <a:t>Hậu quả kinh tế: Mất các dịch vụ liên quan đến côn trùng.</a:t>
+            </a:r>
+          </a:p>
+          <a:p>
+            <a:pPr>
+              <a:defRPr/>
+            </a:pPr>
+            <a:r>
+              <a:t>Thị trường côn trùng có lợi trị giá 877 triệu đô la (2023).</a:t>
+            </a:r>
+          </a:p>
+          <a:p>
+            <a:pPr>
+              <a:defRPr/>
+            </a:pPr>
+            <a:r>
+              <a:t>Tăng trưởng dự kiến 13.2% CAGR (2023-2028), đạt 1.63 tỷ đô la vào năm 2028.</a:t>
+            </a:r>
+          </a:p>
+          <a:p>
+            <a:pPr>
+              <a:defRPr/>
+            </a:pPr>
+            <a:r>
+              <a:t>Bảo tồn côn trùng là rất quan trọng cho một hành tinh khỏe mạnh.</a:t>
+            </a:r>
+          </a:p>
+          <a:p>
+            <a:pPr>
+              <a:defRPr/>
+            </a:pPr>
+            <a:r>
+              <a:t>Cần có các biện pháp bảo tồn để bảo vệ sự đa dạng sinh học và duy trì các hệ sinh thái.</a:t>
+            </a:r>
+          </a:p>
+        </p:txBody>
+      </p:sp>
+    </p:spTree>
+  </p:cSld>
+  <p:clrMapOvr>
+    <a:masterClrMapping/>
+  </p:clrMapOvr>
+</p:sld>
+</file>
+
+<file path=ppt/slides/slide39.xml><?xml version="1.0" encoding="utf-8"?>
+<p:sld xmlns:a="http://schemas.openxmlformats.org/drawingml/2006/main" xmlns:p="http://schemas.openxmlformats.org/presentationml/2006/main" xmlns:r="http://schemas.openxmlformats.org/officeDocument/2006/relationships">
+  <p:cSld>
+    <p:spTree>
+      <p:nvGrpSpPr>
+        <p:cNvPr id="1" name=""/>
+        <p:cNvGrpSpPr/>
+        <p:nvPr/>
+      </p:nvGrpSpPr>
+      <p:grpSpPr/>
+      <p:sp>
+        <p:nvSpPr>
+          <p:cNvPr id="2" name="Title 1"/>
+          <p:cNvSpPr>
+            <a:spLocks noGrp="1"/>
+          </p:cNvSpPr>
+          <p:nvPr>
+            <p:ph type="ctrTitle"/>
+          </p:nvPr>
+        </p:nvSpPr>
+        <p:spPr/>
+        <p:txBody>
+          <a:bodyPr/>
+          <a:lstStyle/>
+          <a:p>
+            <a:pPr>
+              <a:defRPr/>
+            </a:pPr>
+            <a:r>
+              <a:t>Hỏi &amp; Đáp: Thế Giới Côn Trùng</a:t>
+            </a:r>
+          </a:p>
+        </p:txBody>
+      </p:sp>
+      <p:sp>
+        <p:nvSpPr>
+          <p:cNvPr id="3" name="Text Placeholder 2"/>
+          <p:cNvSpPr>
+            <a:spLocks noGrp="1"/>
+          </p:cNvSpPr>
+          <p:nvPr>
+            <p:ph type="body" idx="1" sz="quarter"/>
+          </p:nvPr>
+        </p:nvSpPr>
+        <p:spPr/>
+        <p:txBody>
+          <a:bodyPr/>
+          <a:lstStyle/>
+          <a:p>
+            <a:pPr>
+              <a:defRPr/>
+            </a:pPr>
+            <a:r>
+              <a:t>Xin chân thành cảm ơn sự chú ý của quý vị!</a:t>
+            </a:r>
+          </a:p>
+          <a:p>
+            <a:pPr>
+              <a:defRPr/>
+            </a:pPr>
+            <a:r>
+              <a:t>Chúng tôi rất vui được trả lời bất kỳ câu hỏi nào liên quan đến các chủ đề đã trình bày.</a:t>
+            </a:r>
+          </a:p>
+          <a:p>
+            <a:pPr>
+              <a:defRPr/>
+            </a:pPr>
+            <a:r>
+              <a:t>Liên hệ để biết thêm thông tin: [Your Email Address] / [Your Phone Number]</a:t>
             </a:r>
           </a:p>
         </p:txBody>
@@ -10516,25 +12478,26 @@
         <p:nvPr/>
       </p:nvGrpSpPr>
       <p:grpSpPr/>
-      <p:pic>
-        <p:nvPicPr>
-          <p:cNvPr id="2" name="Picture Placeholder 1" descr="image.png"/>
-          <p:cNvPicPr>
-            <a:picLocks noGrp="1" noChangeAspect="1"/>
-          </p:cNvPicPr>
-          <p:nvPr>
-            <p:ph type="pic" idx="1" sz="quarter"/>
-          </p:nvPr>
-        </p:nvPicPr>
-        <p:blipFill>
-          <a:blip r:embed="rId2"/>
-          <a:srcRect t="10" b="10"/>
-          <a:stretch>
-            <a:fillRect/>
-          </a:stretch>
-        </p:blipFill>
+      <p:sp>
+        <p:nvSpPr>
+          <p:cNvPr id="2" name="Picture Placeholder 1"/>
+          <p:cNvSpPr>
+            <a:spLocks noGrp="1"/>
+          </p:cNvSpPr>
+          <p:nvPr>
+            <p:ph type="pic" idx="10" sz="quarter"/>
+          </p:nvPr>
+        </p:nvSpPr>
         <p:spPr/>
-      </p:pic>
+        <p:txBody>
+          <a:bodyPr/>
+          <a:p>
+            <a:pPr>
+              <a:defRPr/>
+            </a:pPr>
+          </a:p>
+        </p:txBody>
+      </p:sp>
       <p:sp>
         <p:nvSpPr>
           <p:cNvPr id="3" name="Text Placeholder 2"/>
@@ -10554,31 +12517,39 @@
               <a:defRPr/>
             </a:pPr>
             <a:r>
-              <a:t>RL là một phương pháp học máy, trong đó:</a:t>
-            </a:r>
-          </a:p>
-          <a:p>
-            <a:pPr>
-              <a:defRPr/>
-            </a:pPr>
-            <a:r>
-              <a:t>➤ Một agent học cách đưa ra quyết định trong một environment để tối đa hóa reward tích lũy.</a:t>
-            </a:r>
-          </a:p>
-          <a:p>
-            <a:pPr>
-              <a:defRPr/>
-            </a:pPr>
-            <a:r>
-              <a:t>➤ Agent học thông qua thử và sai, không cần dữ liệu được gắn nhãn.</a:t>
-            </a:r>
-          </a:p>
-          <a:p>
-            <a:pPr>
-              <a:defRPr/>
-            </a:pPr>
-            <a:r>
-              <a:t>➤ Tương tác liên tục với môi trường để cải thiện chính sách (policy).</a:t>
+              <a:t>Động vật chân đốt: Ba phần cơ thể (đầu, ngực, bụng)</a:t>
+            </a:r>
+          </a:p>
+          <a:p>
+            <a:pPr>
+              <a:defRPr/>
+            </a:pPr>
+            <a:r>
+              <a:t>Sáu chân</a:t>
+            </a:r>
+          </a:p>
+          <a:p>
+            <a:pPr>
+              <a:defRPr/>
+            </a:pPr>
+            <a:r>
+              <a:t>Râu</a:t>
+            </a:r>
+          </a:p>
+          <a:p>
+            <a:pPr>
+              <a:defRPr/>
+            </a:pPr>
+            <a:r>
+              <a:t>Thường có cánh (một số loài không có)</a:t>
+            </a:r>
+          </a:p>
+          <a:p>
+            <a:pPr>
+              <a:defRPr/>
+            </a:pPr>
+            <a:r>
+              <a:t>Số lượng loài côn trùng chiếm phần lớn trong giới động vật.</a:t>
             </a:r>
           </a:p>
         </p:txBody>
@@ -10602,7 +12573,97 @@
               <a:defRPr/>
             </a:pPr>
             <a:r>
-              <a:t>Reinforcement Learning là gì?</a:t>
+              <a:t>Côn Trùng Là Gì?</a:t>
+            </a:r>
+          </a:p>
+        </p:txBody>
+      </p:sp>
+    </p:spTree>
+  </p:cSld>
+  <p:clrMapOvr>
+    <a:masterClrMapping/>
+  </p:clrMapOvr>
+</p:sld>
+</file>
+
+<file path=ppt/slides/slide40.xml><?xml version="1.0" encoding="utf-8"?>
+<p:sld xmlns:a="http://schemas.openxmlformats.org/drawingml/2006/main" xmlns:p="http://schemas.openxmlformats.org/presentationml/2006/main" xmlns:r="http://schemas.openxmlformats.org/officeDocument/2006/relationships">
+  <p:cSld>
+    <p:spTree>
+      <p:nvGrpSpPr>
+        <p:cNvPr id="1" name=""/>
+        <p:cNvGrpSpPr/>
+        <p:nvPr/>
+      </p:nvGrpSpPr>
+      <p:grpSpPr/>
+      <p:sp>
+        <p:nvSpPr>
+          <p:cNvPr id="2" name="Title 1"/>
+          <p:cNvSpPr>
+            <a:spLocks noGrp="1"/>
+          </p:cNvSpPr>
+          <p:nvPr>
+            <p:ph type="ctrTitle"/>
+          </p:nvPr>
+        </p:nvSpPr>
+        <p:spPr/>
+        <p:txBody>
+          <a:bodyPr/>
+          <a:lstStyle/>
+          <a:p>
+            <a:pPr>
+              <a:defRPr/>
+            </a:pPr>
+            <a:r>
+              <a:t>Tài Nguyên Học Tập Bổ Sung</a:t>
+            </a:r>
+          </a:p>
+        </p:txBody>
+      </p:sp>
+      <p:sp>
+        <p:nvSpPr>
+          <p:cNvPr id="3" name="Text Placeholder 2"/>
+          <p:cNvSpPr>
+            <a:spLocks noGrp="1"/>
+          </p:cNvSpPr>
+          <p:nvPr>
+            <p:ph type="body" idx="1" sz="quarter"/>
+          </p:nvPr>
+        </p:nvSpPr>
+        <p:spPr/>
+        <p:txBody>
+          <a:bodyPr/>
+          <a:lstStyle/>
+          <a:p>
+            <a:pPr>
+              <a:defRPr/>
+            </a:pPr>
+            <a:r>
+              <a:t>Tài liệu tham khảo côn trùng học:</a:t>
+            </a:r>
+          </a:p>
+          <a:p>
+            <a:pPr>
+              <a:defRPr/>
+            </a:pPr>
+            <a:r>
+              <a:t>- Website: vncreatures.net, entsoc.org</a:t>
+            </a:r>
+          </a:p>
+          <a:p>
+            <a:pPr>
+              <a:defRPr/>
+            </a:pPr>
+            <a:r>
+              <a:t>- Sách: Các loại côn trùng VN, Côn trùng &amp; sức khỏe</a:t>
+            </a:r>
+          </a:p>
+          <a:p>
+            <a:pPr>
+              <a:defRPr/>
+            </a:pPr>
+            <a:r>
+              <a:t>- Tổ chức: Viện Sinh thái, Viet Nature, Liên hệ...</a:t>
             </a:r>
           </a:p>
         </p:txBody>
@@ -10625,25 +12686,26 @@
         <p:nvPr/>
       </p:nvGrpSpPr>
       <p:grpSpPr/>
-      <p:pic>
-        <p:nvPicPr>
-          <p:cNvPr id="2" name="Picture Placeholder 1" descr="image.png"/>
-          <p:cNvPicPr>
-            <a:picLocks noGrp="1" noChangeAspect="1"/>
-          </p:cNvPicPr>
-          <p:nvPr>
-            <p:ph type="pic" idx="1" sz="quarter"/>
-          </p:nvPr>
-        </p:nvPicPr>
-        <p:blipFill>
-          <a:blip r:embed="rId2"/>
-          <a:srcRect t="21" b="21"/>
-          <a:stretch>
-            <a:fillRect/>
-          </a:stretch>
-        </p:blipFill>
+      <p:sp>
+        <p:nvSpPr>
+          <p:cNvPr id="2" name="Picture Placeholder 1"/>
+          <p:cNvSpPr>
+            <a:spLocks noGrp="1"/>
+          </p:cNvSpPr>
+          <p:nvPr>
+            <p:ph type="pic" idx="10" sz="quarter"/>
+          </p:nvPr>
+        </p:nvSpPr>
         <p:spPr/>
-      </p:pic>
+        <p:txBody>
+          <a:bodyPr/>
+          <a:p>
+            <a:pPr>
+              <a:defRPr/>
+            </a:pPr>
+          </a:p>
+        </p:txBody>
+      </p:sp>
       <p:sp>
         <p:nvSpPr>
           <p:cNvPr id="3" name="Text Placeholder 2"/>
@@ -10663,31 +12725,31 @@
               <a:defRPr/>
             </a:pPr>
             <a:r>
-              <a:t>RL: Agent tương tác với môi trường.</a:t>
-            </a:r>
-          </a:p>
-          <a:p>
-            <a:pPr>
-              <a:defRPr/>
-            </a:pPr>
-            <a:r>
-              <a:t>Nhận State, thực hiện Action, nhận Reward.</a:t>
-            </a:r>
-          </a:p>
-          <a:p>
-            <a:pPr>
-              <a:defRPr/>
-            </a:pPr>
-            <a:r>
-              <a:t>MDPs: Khuôn khổ toán học cho RL.</a:t>
-            </a:r>
-          </a:p>
-          <a:p>
-            <a:pPr>
-              <a:defRPr/>
-            </a:pPr>
-            <a:r>
-              <a:t>Trạng thái hiện tại chứa đủ thông tin.</a:t>
+              <a:t>Số lượng loài: Ước tính khoảng 5.5 triệu loài (đã biết và chưa biết)</a:t>
+            </a:r>
+          </a:p>
+          <a:p>
+            <a:pPr>
+              <a:defRPr/>
+            </a:pPr>
+            <a:r>
+              <a:t>Chiếm khoảng 80% số loài côn trùng vẫn chưa được mô tả.</a:t>
+            </a:r>
+          </a:p>
+          <a:p>
+            <a:pPr>
+              <a:defRPr/>
+            </a:pPr>
+            <a:r>
+              <a:t>So sánh với các nhóm động vật khác: Vượt trội về số lượng loài.</a:t>
+            </a:r>
+          </a:p>
+          <a:p>
+            <a:pPr>
+              <a:defRPr/>
+            </a:pPr>
+            <a:r>
+              <a:t>Dữ liệu cho thấy, các tình nguyện viên đã thu thập khoảng 25% hồ sơ loài côn trùng trên toàn cầu, và lên đến 80% ở Châu Âu.</a:t>
             </a:r>
           </a:p>
         </p:txBody>
@@ -10711,7 +12773,7 @@
               <a:defRPr/>
             </a:pPr>
             <a:r>
-              <a:t>Các thành phần chính của RL</a:t>
+              <a:t>Sự Đa Dạng Tuyệt Vời Của Côn Trùng</a:t>
             </a:r>
           </a:p>
         </p:txBody>
@@ -10736,7 +12798,83 @@
       <p:grpSpPr/>
       <p:sp>
         <p:nvSpPr>
-          <p:cNvPr id="2" name="Text Placeholder 1"/>
+          <p:cNvPr id="2" name="Picture Placeholder 1"/>
+          <p:cNvSpPr>
+            <a:spLocks noGrp="1"/>
+          </p:cNvSpPr>
+          <p:nvPr>
+            <p:ph type="pic" idx="10" sz="quarter"/>
+          </p:nvPr>
+        </p:nvSpPr>
+        <p:spPr/>
+        <p:txBody>
+          <a:bodyPr/>
+          <a:p>
+            <a:pPr>
+              <a:defRPr/>
+            </a:pPr>
+          </a:p>
+        </p:txBody>
+      </p:sp>
+      <p:sp>
+        <p:nvSpPr>
+          <p:cNvPr id="3" name="Text Placeholder 2"/>
+          <p:cNvSpPr>
+            <a:spLocks noGrp="1"/>
+          </p:cNvSpPr>
+          <p:nvPr>
+            <p:ph type="body" idx="2" sz="quarter"/>
+          </p:nvPr>
+        </p:nvSpPr>
+        <p:spPr/>
+        <p:txBody>
+          <a:bodyPr/>
+          <a:lstStyle/>
+          <a:p>
+            <a:pPr>
+              <a:defRPr/>
+            </a:pPr>
+            <a:r>
+              <a:t>Thụ phấn: Hỗ trợ sinh sản cho nhiều loài thực vật.</a:t>
+            </a:r>
+          </a:p>
+          <a:p>
+            <a:pPr>
+              <a:defRPr/>
+            </a:pPr>
+            <a:r>
+              <a:t>Phân hủy: Phân hủy chất hữu cơ, trả lại chất dinh dưỡng cho đất.</a:t>
+            </a:r>
+          </a:p>
+          <a:p>
+            <a:pPr>
+              <a:defRPr/>
+            </a:pPr>
+            <a:r>
+              <a:t>Chu trình dinh dưỡng: Tham gia vào các chu trình dinh dưỡng quan trọng.</a:t>
+            </a:r>
+          </a:p>
+          <a:p>
+            <a:pPr>
+              <a:defRPr/>
+            </a:pPr>
+            <a:r>
+              <a:t>Nguồn thức ăn: Là nguồn thức ăn cho nhiều loài động vật khác.</a:t>
+            </a:r>
+          </a:p>
+          <a:p>
+            <a:pPr>
+              <a:defRPr/>
+            </a:pPr>
+            <a:r>
+              <a:t>Theo nghiên cứu, sự suy giảm quần thể côn trùng có thể gây ra khủng hoảng thụ phấn, ảnh hưởng đến 75% cây trồng lương thực.</a:t>
+            </a:r>
+          </a:p>
+        </p:txBody>
+      </p:sp>
+      <p:sp>
+        <p:nvSpPr>
+          <p:cNvPr id="4" name="Text Placeholder 3"/>
           <p:cNvSpPr>
             <a:spLocks noGrp="1"/>
           </p:cNvSpPr>
@@ -10753,31 +12891,7 @@
               <a:defRPr/>
             </a:pPr>
             <a:r>
-              <a:t>Thành Công và Hạn Chế của RL</a:t>
-            </a:r>
-          </a:p>
-        </p:txBody>
-      </p:sp>
-      <p:sp>
-        <p:nvSpPr>
-          <p:cNvPr id="3" name="Title 2"/>
-          <p:cNvSpPr>
-            <a:spLocks noGrp="1"/>
-          </p:cNvSpPr>
-          <p:nvPr>
-            <p:ph type="ctrTitle"/>
-          </p:nvPr>
-        </p:nvSpPr>
-        <p:spPr/>
-        <p:txBody>
-          <a:bodyPr/>
-          <a:lstStyle/>
-          <a:p>
-            <a:pPr>
-              <a:defRPr/>
-            </a:pPr>
-            <a:r>
-              <a:t>02</a:t>
+              <a:t>Vai Trò Sinh Thái Quan Trọng</a:t>
             </a:r>
           </a:p>
         </p:txBody>
@@ -10800,25 +12914,26 @@
         <p:nvPr/>
       </p:nvGrpSpPr>
       <p:grpSpPr/>
-      <p:pic>
-        <p:nvPicPr>
-          <p:cNvPr id="2" name="Picture Placeholder 1" descr="image.jpg"/>
-          <p:cNvPicPr>
-            <a:picLocks noGrp="1" noChangeAspect="1"/>
-          </p:cNvPicPr>
-          <p:nvPr>
-            <p:ph type="pic" idx="1" sz="quarter"/>
-          </p:nvPr>
-        </p:nvPicPr>
-        <p:blipFill>
-          <a:blip r:embed="rId2"/>
-          <a:srcRect t="4" b="4"/>
-          <a:stretch>
-            <a:fillRect/>
-          </a:stretch>
-        </p:blipFill>
+      <p:sp>
+        <p:nvSpPr>
+          <p:cNvPr id="2" name="Picture Placeholder 1"/>
+          <p:cNvSpPr>
+            <a:spLocks noGrp="1"/>
+          </p:cNvSpPr>
+          <p:nvPr>
+            <p:ph type="pic" idx="10" sz="quarter"/>
+          </p:nvPr>
+        </p:nvSpPr>
         <p:spPr/>
-      </p:pic>
+        <p:txBody>
+          <a:bodyPr/>
+          <a:p>
+            <a:pPr>
+              <a:defRPr/>
+            </a:pPr>
+          </a:p>
+        </p:txBody>
+      </p:sp>
       <p:sp>
         <p:nvSpPr>
           <p:cNvPr id="3" name="Text Placeholder 2"/>
@@ -10838,23 +12953,39 @@
               <a:defRPr/>
             </a:pPr>
             <a:r>
-              <a:t>Chơi Game: AlphaGo, Atari (vượt trội so với con người)</a:t>
-            </a:r>
-          </a:p>
-          <a:p>
-            <a:pPr>
-              <a:defRPr/>
-            </a:pPr>
-            <a:r>
-              <a:t>Ứng dụng trong Robotics: Điều khiển robot, tự động hóa</a:t>
-            </a:r>
-          </a:p>
-          <a:p>
-            <a:pPr>
-              <a:defRPr/>
-            </a:pPr>
-            <a:r>
-              <a:t>Quản lý Tài nguyên: Tối ưu hóa sử dụng năng lượng, phân bổ tài nguyên</a:t>
+              <a:t>Nông nghiệp: Côn trùng gây hại và côn trùng có ích.</a:t>
+            </a:r>
+          </a:p>
+          <a:p>
+            <a:pPr>
+              <a:defRPr/>
+            </a:pPr>
+            <a:r>
+              <a:t>Y học: Nghiên cứu và ứng dụng trong y học.</a:t>
+            </a:r>
+          </a:p>
+          <a:p>
+            <a:pPr>
+              <a:defRPr/>
+            </a:pPr>
+            <a:r>
+              <a:t>Sản phẩm: Mật ong, tơ tằm, sáp ong...</a:t>
+            </a:r>
+          </a:p>
+          <a:p>
+            <a:pPr>
+              <a:defRPr/>
+            </a:pPr>
+            <a:r>
+              <a:t>Thị trường côn trùng có ích đạt 877 triệu đô la vào năm 2023, với tốc độ tăng trưởng kép hàng năm (CAGR) là 13.2% (2023-2028), dự kiến đạt 1.63 tỷ đô la vào năm 2028. Bắc Mỹ dẫn đầu thị phần.</a:t>
+            </a:r>
+          </a:p>
+          <a:p>
+            <a:pPr>
+              <a:defRPr/>
+            </a:pPr>
+            <a:r>
+              <a:t>Ví dụ cụ thể: Ong mật đóng vai trò quan trọng trong ngành nông nghiệp.</a:t>
             </a:r>
           </a:p>
         </p:txBody>
@@ -10878,7 +13009,7 @@
               <a:defRPr/>
             </a:pPr>
             <a:r>
-              <a:t>Những Thành Công Vượt Bậc của RL</a:t>
+              <a:t>Tầm Quan Trọng Kinh Tế</a:t>
             </a:r>
           </a:p>
         </p:txBody>
@@ -10901,33 +13032,38 @@
         <p:nvPr/>
       </p:nvGrpSpPr>
       <p:grpSpPr/>
-      <p:pic>
-        <p:nvPicPr>
-          <p:cNvPr id="2" name="Picture Placeholder 1" descr="image.png"/>
-          <p:cNvPicPr>
-            <a:picLocks noGrp="1" noChangeAspect="1"/>
-          </p:cNvPicPr>
-          <p:nvPr>
-            <p:ph type="pic" idx="1" sz="quarter"/>
-          </p:nvPr>
-        </p:nvPicPr>
-        <p:blipFill>
-          <a:blip r:embed="rId2"/>
-          <a:srcRect t="7" b="7"/>
-          <a:stretch>
-            <a:fillRect/>
-          </a:stretch>
-        </p:blipFill>
+      <p:sp>
+        <p:nvSpPr>
+          <p:cNvPr id="2" name="Text Placeholder 1"/>
+          <p:cNvSpPr>
+            <a:spLocks noGrp="1"/>
+          </p:cNvSpPr>
+          <p:nvPr>
+            <p:ph type="body" idx="15" sz="quarter"/>
+          </p:nvPr>
+        </p:nvSpPr>
         <p:spPr/>
-      </p:pic>
-      <p:sp>
-        <p:nvSpPr>
-          <p:cNvPr id="3" name="Text Placeholder 2"/>
-          <p:cNvSpPr>
-            <a:spLocks noGrp="1"/>
-          </p:cNvSpPr>
-          <p:nvPr>
-            <p:ph type="body" idx="2" sz="quarter"/>
+        <p:txBody>
+          <a:bodyPr/>
+          <a:lstStyle/>
+          <a:p>
+            <a:pPr>
+              <a:defRPr/>
+            </a:pPr>
+            <a:r>
+              <a:t>Insect Communication and Social Behavior</a:t>
+            </a:r>
+          </a:p>
+        </p:txBody>
+      </p:sp>
+      <p:sp>
+        <p:nvSpPr>
+          <p:cNvPr id="3" name="Title 2"/>
+          <p:cNvSpPr>
+            <a:spLocks noGrp="1"/>
+          </p:cNvSpPr>
+          <p:nvPr>
+            <p:ph type="ctrTitle"/>
           </p:nvPr>
         </p:nvSpPr>
         <p:spPr/>
@@ -10939,47 +13075,7 @@
               <a:defRPr/>
             </a:pPr>
             <a:r>
-              <a:t>Hiệu Quả Mẫu (Sample Efficiency): Cần rất nhiều dữ liệu để học</a:t>
-            </a:r>
-          </a:p>
-          <a:p>
-            <a:pPr>
-              <a:defRPr/>
-            </a:pPr>
-            <a:r>
-              <a:t>Định Hình Phần Thưởng (Reward Shaping): Khó khăn trong việc thiết kế phần thưởng phù hợp</a:t>
-            </a:r>
-          </a:p>
-          <a:p>
-            <a:pPr>
-              <a:defRPr/>
-            </a:pPr>
-            <a:r>
-              <a:t>Khả Năng Tổng Quát Hóa (Generalization): Khó áp dụng cho các tình huống mới</a:t>
-            </a:r>
-          </a:p>
-        </p:txBody>
-      </p:sp>
-      <p:sp>
-        <p:nvSpPr>
-          <p:cNvPr id="4" name="Text Placeholder 3"/>
-          <p:cNvSpPr>
-            <a:spLocks noGrp="1"/>
-          </p:cNvSpPr>
-          <p:nvPr>
-            <p:ph type="body" idx="15" sz="quarter"/>
-          </p:nvPr>
-        </p:nvSpPr>
-        <p:spPr/>
-        <p:txBody>
-          <a:bodyPr/>
-          <a:lstStyle/>
-          <a:p>
-            <a:pPr>
-              <a:defRPr/>
-            </a:pPr>
-            <a:r>
-              <a:t>Những Hạn Chế Của RL Hiện Tại</a:t>
+              <a:t>02</a:t>
             </a:r>
           </a:p>
         </p:txBody>
@@ -11021,7 +13117,7 @@
               <a:defRPr/>
             </a:pPr>
             <a:r>
-              <a:t>RL cho AGI: Thách Thức &amp; Cơ Hội</a:t>
+              <a:t>Insect Communication and Social Behavior</a:t>
             </a:r>
           </a:p>
         </p:txBody>
@@ -11033,7 +13129,7 @@
             <a:spLocks noGrp="1"/>
           </p:cNvSpPr>
           <p:nvPr>
-            <p:ph type="ctrTitle"/>
+            <p:ph type="title"/>
           </p:nvPr>
         </p:nvSpPr>
         <p:spPr/>
@@ -11045,7 +13141,103 @@
               <a:defRPr/>
             </a:pPr>
             <a:r>
-              <a:t>03</a:t>
+              <a:t>Phương Thức Giao Tiếp Của Côn Trùng</a:t>
+            </a:r>
+          </a:p>
+        </p:txBody>
+      </p:sp>
+      <p:sp>
+        <p:nvSpPr>
+          <p:cNvPr id="4" name="Content Placeholder 3"/>
+          <p:cNvSpPr>
+            <a:spLocks noGrp="1"/>
+          </p:cNvSpPr>
+          <p:nvPr>
+            <p:ph idx="1" sz="half"/>
+          </p:nvPr>
+        </p:nvSpPr>
+        <p:spPr/>
+        <p:txBody>
+          <a:bodyPr/>
+          <a:lstStyle/>
+          <a:p>
+            <a:pPr>
+              <a:defRPr/>
+            </a:pPr>
+            <a:r>
+              <a:t>Pheromone (tín hiệu hóa học): Phổ biến nhất</a:t>
+            </a:r>
+          </a:p>
+        </p:txBody>
+      </p:sp>
+      <p:sp>
+        <p:nvSpPr>
+          <p:cNvPr id="5" name="Content Placeholder 4"/>
+          <p:cNvSpPr>
+            <a:spLocks noGrp="1"/>
+          </p:cNvSpPr>
+          <p:nvPr>
+            <p:ph idx="2" sz="half"/>
+          </p:nvPr>
+        </p:nvSpPr>
+        <p:spPr/>
+        <p:txBody>
+          <a:bodyPr/>
+          <a:lstStyle/>
+          <a:p>
+            <a:pPr>
+              <a:defRPr/>
+            </a:pPr>
+            <a:r>
+              <a:t>Tín hiệu thị giác: Màu sắc, chuyển động</a:t>
+            </a:r>
+          </a:p>
+        </p:txBody>
+      </p:sp>
+      <p:sp>
+        <p:nvSpPr>
+          <p:cNvPr id="6" name="Content Placeholder 5"/>
+          <p:cNvSpPr>
+            <a:spLocks noGrp="1"/>
+          </p:cNvSpPr>
+          <p:nvPr>
+            <p:ph idx="3" sz="half"/>
+          </p:nvPr>
+        </p:nvSpPr>
+        <p:spPr/>
+        <p:txBody>
+          <a:bodyPr/>
+          <a:lstStyle/>
+          <a:p>
+            <a:pPr>
+              <a:defRPr/>
+            </a:pPr>
+            <a:r>
+              <a:t>Tín hiệu âm thanh: Tiếng kêu, rung động</a:t>
+            </a:r>
+          </a:p>
+        </p:txBody>
+      </p:sp>
+      <p:sp>
+        <p:nvSpPr>
+          <p:cNvPr id="7" name="Content Placeholder 6"/>
+          <p:cNvSpPr>
+            <a:spLocks noGrp="1"/>
+          </p:cNvSpPr>
+          <p:nvPr>
+            <p:ph idx="4" sz="half"/>
+          </p:nvPr>
+        </p:nvSpPr>
+        <p:spPr/>
+        <p:txBody>
+          <a:bodyPr/>
+          <a:lstStyle/>
+          <a:p>
+            <a:pPr>
+              <a:defRPr/>
+            </a:pPr>
+            <a:r>
+              <a:t>Tín hiệu xúc giác: Tiếp xúc cơ thể</a:t>
             </a:r>
           </a:p>
         </p:txBody>

</xml_diff>